<commit_message>
20 Check for wrong Game Code
</commit_message>
<xml_diff>
--- a/Design.pptx
+++ b/Design.pptx
@@ -264,7 +264,7 @@
           <a:p>
             <a:fld id="{C92431A8-17CE-4556-BA8C-872543424DAF}" type="datetimeFigureOut">
               <a:rPr lang="en-NZ" smtClean="0"/>
-              <a:t>30/05/2023</a:t>
+              <a:t>31/05/2023</a:t>
             </a:fld>
             <a:endParaRPr lang="en-NZ"/>
           </a:p>
@@ -464,7 +464,7 @@
           <a:p>
             <a:fld id="{C92431A8-17CE-4556-BA8C-872543424DAF}" type="datetimeFigureOut">
               <a:rPr lang="en-NZ" smtClean="0"/>
-              <a:t>30/05/2023</a:t>
+              <a:t>31/05/2023</a:t>
             </a:fld>
             <a:endParaRPr lang="en-NZ"/>
           </a:p>
@@ -674,7 +674,7 @@
           <a:p>
             <a:fld id="{C92431A8-17CE-4556-BA8C-872543424DAF}" type="datetimeFigureOut">
               <a:rPr lang="en-NZ" smtClean="0"/>
-              <a:t>30/05/2023</a:t>
+              <a:t>31/05/2023</a:t>
             </a:fld>
             <a:endParaRPr lang="en-NZ"/>
           </a:p>
@@ -874,7 +874,7 @@
           <a:p>
             <a:fld id="{C92431A8-17CE-4556-BA8C-872543424DAF}" type="datetimeFigureOut">
               <a:rPr lang="en-NZ" smtClean="0"/>
-              <a:t>30/05/2023</a:t>
+              <a:t>31/05/2023</a:t>
             </a:fld>
             <a:endParaRPr lang="en-NZ"/>
           </a:p>
@@ -1150,7 +1150,7 @@
           <a:p>
             <a:fld id="{C92431A8-17CE-4556-BA8C-872543424DAF}" type="datetimeFigureOut">
               <a:rPr lang="en-NZ" smtClean="0"/>
-              <a:t>30/05/2023</a:t>
+              <a:t>31/05/2023</a:t>
             </a:fld>
             <a:endParaRPr lang="en-NZ"/>
           </a:p>
@@ -1418,7 +1418,7 @@
           <a:p>
             <a:fld id="{C92431A8-17CE-4556-BA8C-872543424DAF}" type="datetimeFigureOut">
               <a:rPr lang="en-NZ" smtClean="0"/>
-              <a:t>30/05/2023</a:t>
+              <a:t>31/05/2023</a:t>
             </a:fld>
             <a:endParaRPr lang="en-NZ"/>
           </a:p>
@@ -1833,7 +1833,7 @@
           <a:p>
             <a:fld id="{C92431A8-17CE-4556-BA8C-872543424DAF}" type="datetimeFigureOut">
               <a:rPr lang="en-NZ" smtClean="0"/>
-              <a:t>30/05/2023</a:t>
+              <a:t>31/05/2023</a:t>
             </a:fld>
             <a:endParaRPr lang="en-NZ"/>
           </a:p>
@@ -1975,7 +1975,7 @@
           <a:p>
             <a:fld id="{C92431A8-17CE-4556-BA8C-872543424DAF}" type="datetimeFigureOut">
               <a:rPr lang="en-NZ" smtClean="0"/>
-              <a:t>30/05/2023</a:t>
+              <a:t>31/05/2023</a:t>
             </a:fld>
             <a:endParaRPr lang="en-NZ"/>
           </a:p>
@@ -2088,7 +2088,7 @@
           <a:p>
             <a:fld id="{C92431A8-17CE-4556-BA8C-872543424DAF}" type="datetimeFigureOut">
               <a:rPr lang="en-NZ" smtClean="0"/>
-              <a:t>30/05/2023</a:t>
+              <a:t>31/05/2023</a:t>
             </a:fld>
             <a:endParaRPr lang="en-NZ"/>
           </a:p>
@@ -2401,7 +2401,7 @@
           <a:p>
             <a:fld id="{C92431A8-17CE-4556-BA8C-872543424DAF}" type="datetimeFigureOut">
               <a:rPr lang="en-NZ" smtClean="0"/>
-              <a:t>30/05/2023</a:t>
+              <a:t>31/05/2023</a:t>
             </a:fld>
             <a:endParaRPr lang="en-NZ"/>
           </a:p>
@@ -2690,7 +2690,7 @@
           <a:p>
             <a:fld id="{C92431A8-17CE-4556-BA8C-872543424DAF}" type="datetimeFigureOut">
               <a:rPr lang="en-NZ" smtClean="0"/>
-              <a:t>30/05/2023</a:t>
+              <a:t>31/05/2023</a:t>
             </a:fld>
             <a:endParaRPr lang="en-NZ"/>
           </a:p>
@@ -2933,7 +2933,7 @@
           <a:p>
             <a:fld id="{C92431A8-17CE-4556-BA8C-872543424DAF}" type="datetimeFigureOut">
               <a:rPr lang="en-NZ" smtClean="0"/>
-              <a:t>30/05/2023</a:t>
+              <a:t>31/05/2023</a:t>
             </a:fld>
             <a:endParaRPr lang="en-NZ"/>
           </a:p>
@@ -3395,10 +3395,21 @@
             <p:ph idx="1"/>
           </p:nvPr>
         </p:nvSpPr>
-        <p:spPr/>
-        <p:txBody>
-          <a:bodyPr/>
-          <a:lstStyle/>
+        <p:spPr>
+          <a:xfrm>
+            <a:off x="669758" y="1520824"/>
+            <a:ext cx="10515600" cy="4791743"/>
+          </a:xfrm>
+        </p:spPr>
+        <p:txBody>
+          <a:bodyPr/>
+          <a:lstStyle/>
+          <a:p>
+            <a:r>
+              <a:rPr lang="en-US" dirty="0"/>
+              <a:t>Starting Score at 20</a:t>
+            </a:r>
+          </a:p>
           <a:p>
             <a:r>
               <a:rPr lang="en-US" dirty="0"/>
@@ -3415,7 +3426,13 @@
           <a:p>
             <a:r>
               <a:rPr lang="en-US" dirty="0"/>
-              <a:t>(-1 ) Point for every Incorrect Scan</a:t>
+              <a:t>(-2) Point for every Incorrect Scan for different game code</a:t>
+            </a:r>
+          </a:p>
+          <a:p>
+            <a:r>
+              <a:rPr lang="en-US" dirty="0"/>
+              <a:t>(-1 ) Point for every Incorrect Scan in same game code</a:t>
             </a:r>
           </a:p>
           <a:p>

</xml_diff>

<commit_message>
power point try to make it more simpler
</commit_message>
<xml_diff>
--- a/Design.pptx
+++ b/Design.pptx
@@ -184,7 +184,7 @@
           <a:noFill/>
           <a:extLst>
             <a:ext uri="{909E8E84-426E-40dd-AFC4-6F175D3DCCD1}">
-              <a14:hiddenFill xmlns="" xmlns:a14="http://schemas.microsoft.com/office/drawing/2010/main">
+              <a14:hiddenFill xmlns:a14="http://schemas.microsoft.com/office/drawing/2010/main" xmlns="">
                 <a:solidFill>
                   <a:srgbClr val="FFFFFF"/>
                 </a:solidFill>
@@ -243,7 +243,7 @@
             </a:ln>
             <a:extLst>
               <a:ext uri="{91240B29-F687-4f45-9708-019B960494DF}">
-                <a14:hiddenLine xmlns="" xmlns:a14="http://schemas.microsoft.com/office/drawing/2010/main" w="9525">
+                <a14:hiddenLine xmlns:a14="http://schemas.microsoft.com/office/drawing/2010/main" xmlns="" w="9525">
                   <a:solidFill>
                     <a:srgbClr val="000000"/>
                   </a:solidFill>
@@ -333,7 +333,7 @@
             </a:ln>
             <a:extLst>
               <a:ext uri="{91240B29-F687-4f45-9708-019B960494DF}">
-                <a14:hiddenLine xmlns="" xmlns:a14="http://schemas.microsoft.com/office/drawing/2010/main" w="9525">
+                <a14:hiddenLine xmlns:a14="http://schemas.microsoft.com/office/drawing/2010/main" xmlns="" w="9525">
                   <a:solidFill>
                     <a:srgbClr val="000000"/>
                   </a:solidFill>
@@ -423,7 +423,7 @@
             </a:ln>
             <a:extLst>
               <a:ext uri="{91240B29-F687-4f45-9708-019B960494DF}">
-                <a14:hiddenLine xmlns="" xmlns:a14="http://schemas.microsoft.com/office/drawing/2010/main" w="9525">
+                <a14:hiddenLine xmlns:a14="http://schemas.microsoft.com/office/drawing/2010/main" xmlns="" w="9525">
                   <a:solidFill>
                     <a:srgbClr val="000000"/>
                   </a:solidFill>
@@ -457,7 +457,7 @@
             </a:ln>
             <a:extLst>
               <a:ext uri="{91240B29-F687-4f45-9708-019B960494DF}">
-                <a14:hiddenLine xmlns="" xmlns:a14="http://schemas.microsoft.com/office/drawing/2010/main" w="9525">
+                <a14:hiddenLine xmlns:a14="http://schemas.microsoft.com/office/drawing/2010/main" xmlns="" w="9525">
                   <a:solidFill>
                     <a:srgbClr val="000000"/>
                   </a:solidFill>
@@ -547,7 +547,7 @@
             </a:ln>
             <a:extLst>
               <a:ext uri="{91240B29-F687-4f45-9708-019B960494DF}">
-                <a14:hiddenLine xmlns="" xmlns:a14="http://schemas.microsoft.com/office/drawing/2010/main" w="9525">
+                <a14:hiddenLine xmlns:a14="http://schemas.microsoft.com/office/drawing/2010/main" xmlns="" w="9525">
                   <a:solidFill>
                     <a:srgbClr val="000000"/>
                   </a:solidFill>
@@ -609,7 +609,7 @@
             </a:ln>
             <a:extLst>
               <a:ext uri="{91240B29-F687-4f45-9708-019B960494DF}">
-                <a14:hiddenLine xmlns="" xmlns:a14="http://schemas.microsoft.com/office/drawing/2010/main" w="9525">
+                <a14:hiddenLine xmlns:a14="http://schemas.microsoft.com/office/drawing/2010/main" xmlns="" w="9525">
                   <a:solidFill>
                     <a:srgbClr val="000000"/>
                   </a:solidFill>
@@ -671,7 +671,7 @@
             </a:ln>
             <a:extLst>
               <a:ext uri="{91240B29-F687-4f45-9708-019B960494DF}">
-                <a14:hiddenLine xmlns="" xmlns:a14="http://schemas.microsoft.com/office/drawing/2010/main" w="9525">
+                <a14:hiddenLine xmlns:a14="http://schemas.microsoft.com/office/drawing/2010/main" xmlns="" w="9525">
                   <a:solidFill>
                     <a:srgbClr val="000000"/>
                   </a:solidFill>
@@ -761,7 +761,7 @@
             </a:ln>
             <a:extLst>
               <a:ext uri="{91240B29-F687-4f45-9708-019B960494DF}">
-                <a14:hiddenLine xmlns="" xmlns:a14="http://schemas.microsoft.com/office/drawing/2010/main" w="9525">
+                <a14:hiddenLine xmlns:a14="http://schemas.microsoft.com/office/drawing/2010/main" xmlns="" w="9525">
                   <a:solidFill>
                     <a:srgbClr val="000000"/>
                   </a:solidFill>
@@ -823,7 +823,7 @@
             </a:ln>
             <a:extLst>
               <a:ext uri="{91240B29-F687-4f45-9708-019B960494DF}">
-                <a14:hiddenLine xmlns="" xmlns:a14="http://schemas.microsoft.com/office/drawing/2010/main" w="9525">
+                <a14:hiddenLine xmlns:a14="http://schemas.microsoft.com/office/drawing/2010/main" xmlns="" w="9525">
                   <a:solidFill>
                     <a:srgbClr val="000000"/>
                   </a:solidFill>
@@ -885,7 +885,7 @@
             </a:ln>
             <a:extLst>
               <a:ext uri="{91240B29-F687-4f45-9708-019B960494DF}">
-                <a14:hiddenLine xmlns="" xmlns:a14="http://schemas.microsoft.com/office/drawing/2010/main" w="9525">
+                <a14:hiddenLine xmlns:a14="http://schemas.microsoft.com/office/drawing/2010/main" xmlns="" w="9525">
                   <a:solidFill>
                     <a:srgbClr val="000000"/>
                   </a:solidFill>
@@ -975,7 +975,7 @@
             </a:ln>
             <a:extLst>
               <a:ext uri="{91240B29-F687-4f45-9708-019B960494DF}">
-                <a14:hiddenLine xmlns="" xmlns:a14="http://schemas.microsoft.com/office/drawing/2010/main" w="9525">
+                <a14:hiddenLine xmlns:a14="http://schemas.microsoft.com/office/drawing/2010/main" xmlns="" w="9525">
                   <a:solidFill>
                     <a:srgbClr val="000000"/>
                   </a:solidFill>
@@ -1065,7 +1065,7 @@
             </a:ln>
             <a:extLst>
               <a:ext uri="{91240B29-F687-4f45-9708-019B960494DF}">
-                <a14:hiddenLine xmlns="" xmlns:a14="http://schemas.microsoft.com/office/drawing/2010/main" w="9525">
+                <a14:hiddenLine xmlns:a14="http://schemas.microsoft.com/office/drawing/2010/main" xmlns="" w="9525">
                   <a:solidFill>
                     <a:srgbClr val="000000"/>
                   </a:solidFill>
@@ -1127,7 +1127,7 @@
             </a:ln>
             <a:extLst>
               <a:ext uri="{91240B29-F687-4f45-9708-019B960494DF}">
-                <a14:hiddenLine xmlns="" xmlns:a14="http://schemas.microsoft.com/office/drawing/2010/main" w="9525">
+                <a14:hiddenLine xmlns:a14="http://schemas.microsoft.com/office/drawing/2010/main" xmlns="" w="9525">
                   <a:solidFill>
                     <a:srgbClr val="000000"/>
                   </a:solidFill>
@@ -1237,7 +1237,7 @@
             </a:ln>
             <a:extLst>
               <a:ext uri="{91240B29-F687-4f45-9708-019B960494DF}">
-                <a14:hiddenLine xmlns="" xmlns:a14="http://schemas.microsoft.com/office/drawing/2010/main" w="9525">
+                <a14:hiddenLine xmlns:a14="http://schemas.microsoft.com/office/drawing/2010/main" xmlns="" w="9525">
                   <a:solidFill>
                     <a:srgbClr val="000000"/>
                   </a:solidFill>
@@ -1299,7 +1299,7 @@
             </a:ln>
             <a:extLst>
               <a:ext uri="{91240B29-F687-4f45-9708-019B960494DF}">
-                <a14:hiddenLine xmlns="" xmlns:a14="http://schemas.microsoft.com/office/drawing/2010/main" w="9525">
+                <a14:hiddenLine xmlns:a14="http://schemas.microsoft.com/office/drawing/2010/main" xmlns="" w="9525">
                   <a:solidFill>
                     <a:srgbClr val="000000"/>
                   </a:solidFill>
@@ -1389,7 +1389,7 @@
             </a:ln>
             <a:extLst>
               <a:ext uri="{91240B29-F687-4f45-9708-019B960494DF}">
-                <a14:hiddenLine xmlns="" xmlns:a14="http://schemas.microsoft.com/office/drawing/2010/main" w="9525">
+                <a14:hiddenLine xmlns:a14="http://schemas.microsoft.com/office/drawing/2010/main" xmlns="" w="9525">
                   <a:solidFill>
                     <a:srgbClr val="000000"/>
                   </a:solidFill>
@@ -1479,7 +1479,7 @@
             </a:ln>
             <a:extLst>
               <a:ext uri="{91240B29-F687-4f45-9708-019B960494DF}">
-                <a14:hiddenLine xmlns="" xmlns:a14="http://schemas.microsoft.com/office/drawing/2010/main" w="9525">
+                <a14:hiddenLine xmlns:a14="http://schemas.microsoft.com/office/drawing/2010/main" xmlns="" w="9525">
                   <a:solidFill>
                     <a:srgbClr val="000000"/>
                   </a:solidFill>
@@ -1541,7 +1541,7 @@
             </a:ln>
             <a:extLst>
               <a:ext uri="{91240B29-F687-4f45-9708-019B960494DF}">
-                <a14:hiddenLine xmlns="" xmlns:a14="http://schemas.microsoft.com/office/drawing/2010/main" w="9525">
+                <a14:hiddenLine xmlns:a14="http://schemas.microsoft.com/office/drawing/2010/main" xmlns="" w="9525">
                   <a:solidFill>
                     <a:srgbClr val="000000"/>
                   </a:solidFill>
@@ -1631,7 +1631,7 @@
             </a:ln>
             <a:extLst>
               <a:ext uri="{91240B29-F687-4f45-9708-019B960494DF}">
-                <a14:hiddenLine xmlns="" xmlns:a14="http://schemas.microsoft.com/office/drawing/2010/main" w="9525">
+                <a14:hiddenLine xmlns:a14="http://schemas.microsoft.com/office/drawing/2010/main" xmlns="" w="9525">
                   <a:solidFill>
                     <a:srgbClr val="000000"/>
                   </a:solidFill>
@@ -1721,7 +1721,7 @@
             </a:ln>
             <a:extLst>
               <a:ext uri="{91240B29-F687-4f45-9708-019B960494DF}">
-                <a14:hiddenLine xmlns="" xmlns:a14="http://schemas.microsoft.com/office/drawing/2010/main" w="9525">
+                <a14:hiddenLine xmlns:a14="http://schemas.microsoft.com/office/drawing/2010/main" xmlns="" w="9525">
                   <a:solidFill>
                     <a:srgbClr val="000000"/>
                   </a:solidFill>
@@ -1777,7 +1777,7 @@
             </a:ln>
             <a:extLst>
               <a:ext uri="{91240B29-F687-4f45-9708-019B960494DF}">
-                <a14:hiddenLine xmlns="" xmlns:a14="http://schemas.microsoft.com/office/drawing/2010/main" w="9525">
+                <a14:hiddenLine xmlns:a14="http://schemas.microsoft.com/office/drawing/2010/main" xmlns="" w="9525">
                   <a:solidFill>
                     <a:srgbClr val="000000"/>
                   </a:solidFill>
@@ -1867,7 +1867,7 @@
             </a:ln>
             <a:extLst>
               <a:ext uri="{91240B29-F687-4f45-9708-019B960494DF}">
-                <a14:hiddenLine xmlns="" xmlns:a14="http://schemas.microsoft.com/office/drawing/2010/main" w="9525">
+                <a14:hiddenLine xmlns:a14="http://schemas.microsoft.com/office/drawing/2010/main" xmlns="" w="9525">
                   <a:solidFill>
                     <a:srgbClr val="000000"/>
                   </a:solidFill>
@@ -1923,7 +1923,7 @@
             </a:ln>
             <a:extLst>
               <a:ext uri="{91240B29-F687-4f45-9708-019B960494DF}">
-                <a14:hiddenLine xmlns="" xmlns:a14="http://schemas.microsoft.com/office/drawing/2010/main" w="9525">
+                <a14:hiddenLine xmlns:a14="http://schemas.microsoft.com/office/drawing/2010/main" xmlns="" w="9525">
                   <a:solidFill>
                     <a:srgbClr val="000000"/>
                   </a:solidFill>
@@ -2013,7 +2013,7 @@
             </a:ln>
             <a:extLst>
               <a:ext uri="{91240B29-F687-4f45-9708-019B960494DF}">
-                <a14:hiddenLine xmlns="" xmlns:a14="http://schemas.microsoft.com/office/drawing/2010/main" w="9525">
+                <a14:hiddenLine xmlns:a14="http://schemas.microsoft.com/office/drawing/2010/main" xmlns="" w="9525">
                   <a:solidFill>
                     <a:srgbClr val="000000"/>
                   </a:solidFill>
@@ -2081,7 +2081,7 @@
             </a:ln>
             <a:extLst>
               <a:ext uri="{91240B29-F687-4f45-9708-019B960494DF}">
-                <a14:hiddenLine xmlns="" xmlns:a14="http://schemas.microsoft.com/office/drawing/2010/main" w="9525">
+                <a14:hiddenLine xmlns:a14="http://schemas.microsoft.com/office/drawing/2010/main" xmlns="" w="9525">
                   <a:solidFill>
                     <a:srgbClr val="000000"/>
                   </a:solidFill>
@@ -2171,7 +2171,7 @@
             </a:ln>
             <a:extLst>
               <a:ext uri="{91240B29-F687-4f45-9708-019B960494DF}">
-                <a14:hiddenLine xmlns="" xmlns:a14="http://schemas.microsoft.com/office/drawing/2010/main" w="9525">
+                <a14:hiddenLine xmlns:a14="http://schemas.microsoft.com/office/drawing/2010/main" xmlns="" w="9525">
                   <a:solidFill>
                     <a:srgbClr val="000000"/>
                   </a:solidFill>
@@ -2239,7 +2239,7 @@
             </a:ln>
             <a:extLst>
               <a:ext uri="{91240B29-F687-4f45-9708-019B960494DF}">
-                <a14:hiddenLine xmlns="" xmlns:a14="http://schemas.microsoft.com/office/drawing/2010/main" w="9525">
+                <a14:hiddenLine xmlns:a14="http://schemas.microsoft.com/office/drawing/2010/main" xmlns="" w="9525">
                   <a:solidFill>
                     <a:srgbClr val="000000"/>
                   </a:solidFill>
@@ -2329,7 +2329,7 @@
             </a:ln>
             <a:extLst>
               <a:ext uri="{91240B29-F687-4f45-9708-019B960494DF}">
-                <a14:hiddenLine xmlns="" xmlns:a14="http://schemas.microsoft.com/office/drawing/2010/main" w="9525">
+                <a14:hiddenLine xmlns:a14="http://schemas.microsoft.com/office/drawing/2010/main" xmlns="" w="9525">
                   <a:solidFill>
                     <a:srgbClr val="000000"/>
                   </a:solidFill>
@@ -2363,7 +2363,7 @@
             </a:ln>
             <a:extLst>
               <a:ext uri="{91240B29-F687-4f45-9708-019B960494DF}">
-                <a14:hiddenLine xmlns="" xmlns:a14="http://schemas.microsoft.com/office/drawing/2010/main" w="9525">
+                <a14:hiddenLine xmlns:a14="http://schemas.microsoft.com/office/drawing/2010/main" xmlns="" w="9525">
                   <a:solidFill>
                     <a:srgbClr val="000000"/>
                   </a:solidFill>
@@ -2453,7 +2453,7 @@
             </a:ln>
             <a:extLst>
               <a:ext uri="{91240B29-F687-4f45-9708-019B960494DF}">
-                <a14:hiddenLine xmlns="" xmlns:a14="http://schemas.microsoft.com/office/drawing/2010/main" w="9525">
+                <a14:hiddenLine xmlns:a14="http://schemas.microsoft.com/office/drawing/2010/main" xmlns="" w="9525">
                   <a:solidFill>
                     <a:srgbClr val="000000"/>
                   </a:solidFill>
@@ -2515,7 +2515,7 @@
             </a:ln>
             <a:extLst>
               <a:ext uri="{91240B29-F687-4f45-9708-019B960494DF}">
-                <a14:hiddenLine xmlns="" xmlns:a14="http://schemas.microsoft.com/office/drawing/2010/main" w="9525">
+                <a14:hiddenLine xmlns:a14="http://schemas.microsoft.com/office/drawing/2010/main" xmlns="" w="9525">
                   <a:solidFill>
                     <a:srgbClr val="000000"/>
                   </a:solidFill>
@@ -2577,7 +2577,7 @@
             </a:ln>
             <a:extLst>
               <a:ext uri="{91240B29-F687-4f45-9708-019B960494DF}">
-                <a14:hiddenLine xmlns="" xmlns:a14="http://schemas.microsoft.com/office/drawing/2010/main" w="9525">
+                <a14:hiddenLine xmlns:a14="http://schemas.microsoft.com/office/drawing/2010/main" xmlns="" w="9525">
                   <a:solidFill>
                     <a:srgbClr val="000000"/>
                   </a:solidFill>
@@ -2667,7 +2667,7 @@
             </a:ln>
             <a:extLst>
               <a:ext uri="{91240B29-F687-4f45-9708-019B960494DF}">
-                <a14:hiddenLine xmlns="" xmlns:a14="http://schemas.microsoft.com/office/drawing/2010/main" w="9525">
+                <a14:hiddenLine xmlns:a14="http://schemas.microsoft.com/office/drawing/2010/main" xmlns="" w="9525">
                   <a:solidFill>
                     <a:srgbClr val="000000"/>
                   </a:solidFill>
@@ -2735,7 +2735,7 @@
             </a:ln>
             <a:extLst>
               <a:ext uri="{91240B29-F687-4f45-9708-019B960494DF}">
-                <a14:hiddenLine xmlns="" xmlns:a14="http://schemas.microsoft.com/office/drawing/2010/main" w="9525">
+                <a14:hiddenLine xmlns:a14="http://schemas.microsoft.com/office/drawing/2010/main" xmlns="" w="9525">
                   <a:solidFill>
                     <a:srgbClr val="000000"/>
                   </a:solidFill>
@@ -2797,7 +2797,7 @@
             </a:ln>
             <a:extLst>
               <a:ext uri="{91240B29-F687-4f45-9708-019B960494DF}">
-                <a14:hiddenLine xmlns="" xmlns:a14="http://schemas.microsoft.com/office/drawing/2010/main" w="9525">
+                <a14:hiddenLine xmlns:a14="http://schemas.microsoft.com/office/drawing/2010/main" xmlns="" w="9525">
                   <a:solidFill>
                     <a:srgbClr val="000000"/>
                   </a:solidFill>
@@ -2887,7 +2887,7 @@
             </a:ln>
             <a:extLst>
               <a:ext uri="{91240B29-F687-4f45-9708-019B960494DF}">
-                <a14:hiddenLine xmlns="" xmlns:a14="http://schemas.microsoft.com/office/drawing/2010/main" w="9525">
+                <a14:hiddenLine xmlns:a14="http://schemas.microsoft.com/office/drawing/2010/main" xmlns="" w="9525">
                   <a:solidFill>
                     <a:srgbClr val="000000"/>
                   </a:solidFill>
@@ -2949,7 +2949,7 @@
             </a:ln>
             <a:extLst>
               <a:ext uri="{91240B29-F687-4f45-9708-019B960494DF}">
-                <a14:hiddenLine xmlns="" xmlns:a14="http://schemas.microsoft.com/office/drawing/2010/main" w="9525">
+                <a14:hiddenLine xmlns:a14="http://schemas.microsoft.com/office/drawing/2010/main" xmlns="" w="9525">
                   <a:solidFill>
                     <a:srgbClr val="000000"/>
                   </a:solidFill>
@@ -3039,7 +3039,7 @@
             </a:ln>
             <a:extLst>
               <a:ext uri="{91240B29-F687-4f45-9708-019B960494DF}">
-                <a14:hiddenLine xmlns="" xmlns:a14="http://schemas.microsoft.com/office/drawing/2010/main" w="9525">
+                <a14:hiddenLine xmlns:a14="http://schemas.microsoft.com/office/drawing/2010/main" xmlns="" w="9525">
                   <a:solidFill>
                     <a:srgbClr val="000000"/>
                   </a:solidFill>
@@ -3101,7 +3101,7 @@
             </a:ln>
             <a:extLst>
               <a:ext uri="{91240B29-F687-4f45-9708-019B960494DF}">
-                <a14:hiddenLine xmlns="" xmlns:a14="http://schemas.microsoft.com/office/drawing/2010/main" w="9525">
+                <a14:hiddenLine xmlns:a14="http://schemas.microsoft.com/office/drawing/2010/main" xmlns="" w="9525">
                   <a:solidFill>
                     <a:srgbClr val="000000"/>
                   </a:solidFill>
@@ -3191,7 +3191,7 @@
             </a:ln>
             <a:extLst>
               <a:ext uri="{91240B29-F687-4f45-9708-019B960494DF}">
-                <a14:hiddenLine xmlns="" xmlns:a14="http://schemas.microsoft.com/office/drawing/2010/main" w="9525">
+                <a14:hiddenLine xmlns:a14="http://schemas.microsoft.com/office/drawing/2010/main" xmlns="" w="9525">
                   <a:solidFill>
                     <a:srgbClr val="000000"/>
                   </a:solidFill>
@@ -3225,7 +3225,7 @@
             </a:ln>
             <a:extLst>
               <a:ext uri="{91240B29-F687-4f45-9708-019B960494DF}">
-                <a14:hiddenLine xmlns="" xmlns:a14="http://schemas.microsoft.com/office/drawing/2010/main" w="9525">
+                <a14:hiddenLine xmlns:a14="http://schemas.microsoft.com/office/drawing/2010/main" xmlns="" w="9525">
                   <a:solidFill>
                     <a:srgbClr val="000000"/>
                   </a:solidFill>
@@ -3290,7 +3290,7 @@
             </a:ln>
             <a:extLst>
               <a:ext uri="{91240B29-F687-4f45-9708-019B960494DF}">
-                <a14:hiddenLine xmlns="" xmlns:a14="http://schemas.microsoft.com/office/drawing/2010/main" w="9525">
+                <a14:hiddenLine xmlns:a14="http://schemas.microsoft.com/office/drawing/2010/main" xmlns="" w="9525">
                   <a:solidFill>
                     <a:srgbClr val="000000"/>
                   </a:solidFill>
@@ -3380,7 +3380,7 @@
             </a:ln>
             <a:extLst>
               <a:ext uri="{91240B29-F687-4f45-9708-019B960494DF}">
-                <a14:hiddenLine xmlns="" xmlns:a14="http://schemas.microsoft.com/office/drawing/2010/main" w="9525">
+                <a14:hiddenLine xmlns:a14="http://schemas.microsoft.com/office/drawing/2010/main" xmlns="" w="9525">
                   <a:solidFill>
                     <a:srgbClr val="000000"/>
                   </a:solidFill>
@@ -3442,7 +3442,7 @@
             </a:ln>
             <a:extLst>
               <a:ext uri="{91240B29-F687-4f45-9708-019B960494DF}">
-                <a14:hiddenLine xmlns="" xmlns:a14="http://schemas.microsoft.com/office/drawing/2010/main" w="9525">
+                <a14:hiddenLine xmlns:a14="http://schemas.microsoft.com/office/drawing/2010/main" xmlns="" w="9525">
                   <a:solidFill>
                     <a:srgbClr val="000000"/>
                   </a:solidFill>
@@ -3532,7 +3532,7 @@
             </a:ln>
             <a:extLst>
               <a:ext uri="{91240B29-F687-4f45-9708-019B960494DF}">
-                <a14:hiddenLine xmlns="" xmlns:a14="http://schemas.microsoft.com/office/drawing/2010/main" w="9525">
+                <a14:hiddenLine xmlns:a14="http://schemas.microsoft.com/office/drawing/2010/main" xmlns="" w="9525">
                   <a:solidFill>
                     <a:srgbClr val="000000"/>
                   </a:solidFill>
@@ -3622,7 +3622,7 @@
             </a:ln>
             <a:extLst>
               <a:ext uri="{91240B29-F687-4f45-9708-019B960494DF}">
-                <a14:hiddenLine xmlns="" xmlns:a14="http://schemas.microsoft.com/office/drawing/2010/main" w="9525">
+                <a14:hiddenLine xmlns:a14="http://schemas.microsoft.com/office/drawing/2010/main" xmlns="" w="9525">
                   <a:solidFill>
                     <a:srgbClr val="000000"/>
                   </a:solidFill>
@@ -3687,7 +3687,7 @@
             </a:ln>
             <a:extLst>
               <a:ext uri="{91240B29-F687-4f45-9708-019B960494DF}">
-                <a14:hiddenLine xmlns="" xmlns:a14="http://schemas.microsoft.com/office/drawing/2010/main" w="9525">
+                <a14:hiddenLine xmlns:a14="http://schemas.microsoft.com/office/drawing/2010/main" xmlns="" w="9525">
                   <a:solidFill>
                     <a:srgbClr val="000000"/>
                   </a:solidFill>
@@ -3749,7 +3749,7 @@
             </a:ln>
             <a:extLst>
               <a:ext uri="{91240B29-F687-4f45-9708-019B960494DF}">
-                <a14:hiddenLine xmlns="" xmlns:a14="http://schemas.microsoft.com/office/drawing/2010/main" w="9525">
+                <a14:hiddenLine xmlns:a14="http://schemas.microsoft.com/office/drawing/2010/main" xmlns="" w="9525">
                   <a:solidFill>
                     <a:srgbClr val="000000"/>
                   </a:solidFill>
@@ -3839,7 +3839,7 @@
             </a:ln>
             <a:extLst>
               <a:ext uri="{91240B29-F687-4f45-9708-019B960494DF}">
-                <a14:hiddenLine xmlns="" xmlns:a14="http://schemas.microsoft.com/office/drawing/2010/main" w="9525">
+                <a14:hiddenLine xmlns:a14="http://schemas.microsoft.com/office/drawing/2010/main" xmlns="" w="9525">
                   <a:solidFill>
                     <a:srgbClr val="000000"/>
                   </a:solidFill>
@@ -3929,7 +3929,7 @@
             </a:ln>
             <a:extLst>
               <a:ext uri="{91240B29-F687-4f45-9708-019B960494DF}">
-                <a14:hiddenLine xmlns="" xmlns:a14="http://schemas.microsoft.com/office/drawing/2010/main" w="9525">
+                <a14:hiddenLine xmlns:a14="http://schemas.microsoft.com/office/drawing/2010/main" xmlns="" w="9525">
                   <a:solidFill>
                     <a:srgbClr val="000000"/>
                   </a:solidFill>
@@ -3991,7 +3991,7 @@
             </a:ln>
             <a:extLst>
               <a:ext uri="{91240B29-F687-4f45-9708-019B960494DF}">
-                <a14:hiddenLine xmlns="" xmlns:a14="http://schemas.microsoft.com/office/drawing/2010/main" w="9525">
+                <a14:hiddenLine xmlns:a14="http://schemas.microsoft.com/office/drawing/2010/main" xmlns="" w="9525">
                   <a:solidFill>
                     <a:srgbClr val="000000"/>
                   </a:solidFill>
@@ -4111,7 +4111,7 @@
             </a:ln>
             <a:extLst>
               <a:ext uri="{91240B29-F687-4f45-9708-019B960494DF}">
-                <a14:hiddenLine xmlns="" xmlns:a14="http://schemas.microsoft.com/office/drawing/2010/main" w="9525">
+                <a14:hiddenLine xmlns:a14="http://schemas.microsoft.com/office/drawing/2010/main" xmlns="" w="9525">
                   <a:solidFill>
                     <a:srgbClr val="000000"/>
                   </a:solidFill>
@@ -4179,7 +4179,7 @@
             </a:ln>
             <a:extLst>
               <a:ext uri="{91240B29-F687-4f45-9708-019B960494DF}">
-                <a14:hiddenLine xmlns="" xmlns:a14="http://schemas.microsoft.com/office/drawing/2010/main" w="9525">
+                <a14:hiddenLine xmlns:a14="http://schemas.microsoft.com/office/drawing/2010/main" xmlns="" w="9525">
                   <a:solidFill>
                     <a:srgbClr val="000000"/>
                   </a:solidFill>
@@ -4269,7 +4269,7 @@
             </a:ln>
             <a:extLst>
               <a:ext uri="{91240B29-F687-4f45-9708-019B960494DF}">
-                <a14:hiddenLine xmlns="" xmlns:a14="http://schemas.microsoft.com/office/drawing/2010/main" w="9525">
+                <a14:hiddenLine xmlns:a14="http://schemas.microsoft.com/office/drawing/2010/main" xmlns="" w="9525">
                   <a:solidFill>
                     <a:srgbClr val="000000"/>
                   </a:solidFill>
@@ -4409,7 +4409,7 @@
           <a:p>
             <a:fld id="{C92431A8-17CE-4556-BA8C-872543424DAF}" type="datetimeFigureOut">
               <a:rPr lang="en-NZ" smtClean="0"/>
-              <a:t>9/06/2023</a:t>
+              <a:t>10/06/2023</a:t>
             </a:fld>
             <a:endParaRPr lang="en-NZ"/>
           </a:p>
@@ -4676,7 +4676,7 @@
           <a:p>
             <a:fld id="{C92431A8-17CE-4556-BA8C-872543424DAF}" type="datetimeFigureOut">
               <a:rPr lang="en-NZ" smtClean="0"/>
-              <a:t>9/06/2023</a:t>
+              <a:t>10/06/2023</a:t>
             </a:fld>
             <a:endParaRPr lang="en-NZ"/>
           </a:p>
@@ -4872,7 +4872,7 @@
           <a:p>
             <a:fld id="{C92431A8-17CE-4556-BA8C-872543424DAF}" type="datetimeFigureOut">
               <a:rPr lang="en-NZ" smtClean="0"/>
-              <a:t>9/06/2023</a:t>
+              <a:t>10/06/2023</a:t>
             </a:fld>
             <a:endParaRPr lang="en-NZ"/>
           </a:p>
@@ -5135,7 +5135,7 @@
           <a:p>
             <a:fld id="{C92431A8-17CE-4556-BA8C-872543424DAF}" type="datetimeFigureOut">
               <a:rPr lang="en-NZ" smtClean="0"/>
-              <a:t>9/06/2023</a:t>
+              <a:t>10/06/2023</a:t>
             </a:fld>
             <a:endParaRPr lang="en-NZ"/>
           </a:p>
@@ -5569,7 +5569,7 @@
           <a:p>
             <a:fld id="{C92431A8-17CE-4556-BA8C-872543424DAF}" type="datetimeFigureOut">
               <a:rPr lang="en-NZ" smtClean="0"/>
-              <a:t>9/06/2023</a:t>
+              <a:t>10/06/2023</a:t>
             </a:fld>
             <a:endParaRPr lang="en-NZ"/>
           </a:p>
@@ -6115,7 +6115,7 @@
           <a:p>
             <a:fld id="{C92431A8-17CE-4556-BA8C-872543424DAF}" type="datetimeFigureOut">
               <a:rPr lang="en-NZ" smtClean="0"/>
-              <a:t>9/06/2023</a:t>
+              <a:t>10/06/2023</a:t>
             </a:fld>
             <a:endParaRPr lang="en-NZ"/>
           </a:p>
@@ -6835,7 +6835,7 @@
           <a:p>
             <a:fld id="{C92431A8-17CE-4556-BA8C-872543424DAF}" type="datetimeFigureOut">
               <a:rPr lang="en-NZ" smtClean="0"/>
-              <a:t>9/06/2023</a:t>
+              <a:t>10/06/2023</a:t>
             </a:fld>
             <a:endParaRPr lang="en-NZ"/>
           </a:p>
@@ -7005,7 +7005,7 @@
           <a:p>
             <a:fld id="{C92431A8-17CE-4556-BA8C-872543424DAF}" type="datetimeFigureOut">
               <a:rPr lang="en-NZ" smtClean="0"/>
-              <a:t>9/06/2023</a:t>
+              <a:t>10/06/2023</a:t>
             </a:fld>
             <a:endParaRPr lang="en-NZ"/>
           </a:p>
@@ -7185,7 +7185,7 @@
           <a:p>
             <a:fld id="{C92431A8-17CE-4556-BA8C-872543424DAF}" type="datetimeFigureOut">
               <a:rPr lang="en-NZ" smtClean="0"/>
-              <a:t>9/06/2023</a:t>
+              <a:t>10/06/2023</a:t>
             </a:fld>
             <a:endParaRPr lang="en-NZ"/>
           </a:p>
@@ -7355,7 +7355,7 @@
           <a:p>
             <a:fld id="{C92431A8-17CE-4556-BA8C-872543424DAF}" type="datetimeFigureOut">
               <a:rPr lang="en-NZ" smtClean="0"/>
-              <a:t>9/06/2023</a:t>
+              <a:t>10/06/2023</a:t>
             </a:fld>
             <a:endParaRPr lang="en-NZ"/>
           </a:p>
@@ -7605,7 +7605,7 @@
           <a:p>
             <a:fld id="{C92431A8-17CE-4556-BA8C-872543424DAF}" type="datetimeFigureOut">
               <a:rPr lang="en-NZ" smtClean="0"/>
-              <a:t>9/06/2023</a:t>
+              <a:t>10/06/2023</a:t>
             </a:fld>
             <a:endParaRPr lang="en-NZ"/>
           </a:p>
@@ -7837,7 +7837,7 @@
           <a:p>
             <a:fld id="{C92431A8-17CE-4556-BA8C-872543424DAF}" type="datetimeFigureOut">
               <a:rPr lang="en-NZ" smtClean="0"/>
-              <a:t>9/06/2023</a:t>
+              <a:t>10/06/2023</a:t>
             </a:fld>
             <a:endParaRPr lang="en-NZ"/>
           </a:p>
@@ -8218,7 +8218,7 @@
           <a:p>
             <a:fld id="{C92431A8-17CE-4556-BA8C-872543424DAF}" type="datetimeFigureOut">
               <a:rPr lang="en-NZ" smtClean="0"/>
-              <a:t>9/06/2023</a:t>
+              <a:t>10/06/2023</a:t>
             </a:fld>
             <a:endParaRPr lang="en-NZ"/>
           </a:p>
@@ -8336,7 +8336,7 @@
           <a:p>
             <a:fld id="{C92431A8-17CE-4556-BA8C-872543424DAF}" type="datetimeFigureOut">
               <a:rPr lang="en-NZ" smtClean="0"/>
-              <a:t>9/06/2023</a:t>
+              <a:t>10/06/2023</a:t>
             </a:fld>
             <a:endParaRPr lang="en-NZ"/>
           </a:p>
@@ -8431,7 +8431,7 @@
           <a:p>
             <a:fld id="{C92431A8-17CE-4556-BA8C-872543424DAF}" type="datetimeFigureOut">
               <a:rPr lang="en-NZ" smtClean="0"/>
-              <a:t>9/06/2023</a:t>
+              <a:t>10/06/2023</a:t>
             </a:fld>
             <a:endParaRPr lang="en-NZ"/>
           </a:p>
@@ -8680,7 +8680,7 @@
           <a:p>
             <a:fld id="{C92431A8-17CE-4556-BA8C-872543424DAF}" type="datetimeFigureOut">
               <a:rPr lang="en-NZ" smtClean="0"/>
-              <a:t>9/06/2023</a:t>
+              <a:t>10/06/2023</a:t>
             </a:fld>
             <a:endParaRPr lang="en-NZ"/>
           </a:p>
@@ -8960,7 +8960,7 @@
           <a:p>
             <a:fld id="{C92431A8-17CE-4556-BA8C-872543424DAF}" type="datetimeFigureOut">
               <a:rPr lang="en-NZ" smtClean="0"/>
-              <a:t>9/06/2023</a:t>
+              <a:t>10/06/2023</a:t>
             </a:fld>
             <a:endParaRPr lang="en-NZ"/>
           </a:p>
@@ -9083,7 +9083,7 @@
           <a:noFill/>
           <a:extLst>
             <a:ext uri="{909E8E84-426E-40dd-AFC4-6F175D3DCCD1}">
-              <a14:hiddenFill xmlns="" xmlns:a14="http://schemas.microsoft.com/office/drawing/2010/main">
+              <a14:hiddenFill xmlns:a14="http://schemas.microsoft.com/office/drawing/2010/main" xmlns="">
                 <a:solidFill>
                   <a:srgbClr val="FFFFFF"/>
                 </a:solidFill>
@@ -9157,7 +9157,7 @@
               </a:ln>
               <a:extLst>
                 <a:ext uri="{91240B29-F687-4f45-9708-019B960494DF}">
-                  <a14:hiddenLine xmlns="" xmlns:a14="http://schemas.microsoft.com/office/drawing/2010/main" w="9525">
+                  <a14:hiddenLine xmlns:a14="http://schemas.microsoft.com/office/drawing/2010/main" xmlns="" w="9525">
                     <a:solidFill>
                       <a:srgbClr val="000000"/>
                     </a:solidFill>
@@ -9247,7 +9247,7 @@
               </a:ln>
               <a:extLst>
                 <a:ext uri="{91240B29-F687-4f45-9708-019B960494DF}">
-                  <a14:hiddenLine xmlns="" xmlns:a14="http://schemas.microsoft.com/office/drawing/2010/main" w="9525">
+                  <a14:hiddenLine xmlns:a14="http://schemas.microsoft.com/office/drawing/2010/main" xmlns="" w="9525">
                     <a:solidFill>
                       <a:srgbClr val="000000"/>
                     </a:solidFill>
@@ -9337,7 +9337,7 @@
               </a:ln>
               <a:extLst>
                 <a:ext uri="{91240B29-F687-4f45-9708-019B960494DF}">
-                  <a14:hiddenLine xmlns="" xmlns:a14="http://schemas.microsoft.com/office/drawing/2010/main" w="9525">
+                  <a14:hiddenLine xmlns:a14="http://schemas.microsoft.com/office/drawing/2010/main" xmlns="" w="9525">
                     <a:solidFill>
                       <a:srgbClr val="000000"/>
                     </a:solidFill>
@@ -9399,7 +9399,7 @@
               </a:ln>
               <a:extLst>
                 <a:ext uri="{91240B29-F687-4f45-9708-019B960494DF}">
-                  <a14:hiddenLine xmlns="" xmlns:a14="http://schemas.microsoft.com/office/drawing/2010/main" w="9525">
+                  <a14:hiddenLine xmlns:a14="http://schemas.microsoft.com/office/drawing/2010/main" xmlns="" w="9525">
                     <a:solidFill>
                       <a:srgbClr val="000000"/>
                     </a:solidFill>
@@ -9489,7 +9489,7 @@
               </a:ln>
               <a:extLst>
                 <a:ext uri="{91240B29-F687-4f45-9708-019B960494DF}">
-                  <a14:hiddenLine xmlns="" xmlns:a14="http://schemas.microsoft.com/office/drawing/2010/main" w="9525">
+                  <a14:hiddenLine xmlns:a14="http://schemas.microsoft.com/office/drawing/2010/main" xmlns="" w="9525">
                     <a:solidFill>
                       <a:srgbClr val="000000"/>
                     </a:solidFill>
@@ -9551,7 +9551,7 @@
               </a:ln>
               <a:extLst>
                 <a:ext uri="{91240B29-F687-4f45-9708-019B960494DF}">
-                  <a14:hiddenLine xmlns="" xmlns:a14="http://schemas.microsoft.com/office/drawing/2010/main" w="9525">
+                  <a14:hiddenLine xmlns:a14="http://schemas.microsoft.com/office/drawing/2010/main" xmlns="" w="9525">
                     <a:solidFill>
                       <a:srgbClr val="000000"/>
                     </a:solidFill>
@@ -9613,7 +9613,7 @@
               </a:ln>
               <a:extLst>
                 <a:ext uri="{91240B29-F687-4f45-9708-019B960494DF}">
-                  <a14:hiddenLine xmlns="" xmlns:a14="http://schemas.microsoft.com/office/drawing/2010/main" w="9525">
+                  <a14:hiddenLine xmlns:a14="http://schemas.microsoft.com/office/drawing/2010/main" xmlns="" w="9525">
                     <a:solidFill>
                       <a:srgbClr val="000000"/>
                     </a:solidFill>
@@ -9703,7 +9703,7 @@
               </a:ln>
               <a:extLst>
                 <a:ext uri="{91240B29-F687-4f45-9708-019B960494DF}">
-                  <a14:hiddenLine xmlns="" xmlns:a14="http://schemas.microsoft.com/office/drawing/2010/main" w="9525">
+                  <a14:hiddenLine xmlns:a14="http://schemas.microsoft.com/office/drawing/2010/main" xmlns="" w="9525">
                     <a:solidFill>
                       <a:srgbClr val="000000"/>
                     </a:solidFill>
@@ -9793,7 +9793,7 @@
               </a:ln>
               <a:extLst>
                 <a:ext uri="{91240B29-F687-4f45-9708-019B960494DF}">
-                  <a14:hiddenLine xmlns="" xmlns:a14="http://schemas.microsoft.com/office/drawing/2010/main" w="9525">
+                  <a14:hiddenLine xmlns:a14="http://schemas.microsoft.com/office/drawing/2010/main" xmlns="" w="9525">
                     <a:solidFill>
                       <a:srgbClr val="000000"/>
                     </a:solidFill>
@@ -9855,7 +9855,7 @@
               </a:ln>
               <a:extLst>
                 <a:ext uri="{91240B29-F687-4f45-9708-019B960494DF}">
-                  <a14:hiddenLine xmlns="" xmlns:a14="http://schemas.microsoft.com/office/drawing/2010/main" w="9525">
+                  <a14:hiddenLine xmlns:a14="http://schemas.microsoft.com/office/drawing/2010/main" xmlns="" w="9525">
                     <a:solidFill>
                       <a:srgbClr val="000000"/>
                     </a:solidFill>
@@ -9965,7 +9965,7 @@
               </a:ln>
               <a:extLst>
                 <a:ext uri="{91240B29-F687-4f45-9708-019B960494DF}">
-                  <a14:hiddenLine xmlns="" xmlns:a14="http://schemas.microsoft.com/office/drawing/2010/main" w="9525">
+                  <a14:hiddenLine xmlns:a14="http://schemas.microsoft.com/office/drawing/2010/main" xmlns="" w="9525">
                     <a:solidFill>
                       <a:srgbClr val="000000"/>
                     </a:solidFill>
@@ -10049,7 +10049,7 @@
               </a:ln>
               <a:extLst>
                 <a:ext uri="{91240B29-F687-4f45-9708-019B960494DF}">
-                  <a14:hiddenLine xmlns="" xmlns:a14="http://schemas.microsoft.com/office/drawing/2010/main" w="9525">
+                  <a14:hiddenLine xmlns:a14="http://schemas.microsoft.com/office/drawing/2010/main" xmlns="" w="9525">
                     <a:solidFill>
                       <a:srgbClr val="000000"/>
                     </a:solidFill>
@@ -10111,7 +10111,7 @@
               </a:ln>
               <a:extLst>
                 <a:ext uri="{91240B29-F687-4f45-9708-019B960494DF}">
-                  <a14:hiddenLine xmlns="" xmlns:a14="http://schemas.microsoft.com/office/drawing/2010/main" w="9525">
+                  <a14:hiddenLine xmlns:a14="http://schemas.microsoft.com/office/drawing/2010/main" xmlns="" w="9525">
                     <a:solidFill>
                       <a:srgbClr val="000000"/>
                     </a:solidFill>
@@ -10173,7 +10173,7 @@
               </a:ln>
               <a:extLst>
                 <a:ext uri="{91240B29-F687-4f45-9708-019B960494DF}">
-                  <a14:hiddenLine xmlns="" xmlns:a14="http://schemas.microsoft.com/office/drawing/2010/main" w="9525">
+                  <a14:hiddenLine xmlns:a14="http://schemas.microsoft.com/office/drawing/2010/main" xmlns="" w="9525">
                     <a:solidFill>
                       <a:srgbClr val="000000"/>
                     </a:solidFill>
@@ -10263,7 +10263,7 @@
               </a:ln>
               <a:extLst>
                 <a:ext uri="{91240B29-F687-4f45-9708-019B960494DF}">
-                  <a14:hiddenLine xmlns="" xmlns:a14="http://schemas.microsoft.com/office/drawing/2010/main" w="9525">
+                  <a14:hiddenLine xmlns:a14="http://schemas.microsoft.com/office/drawing/2010/main" xmlns="" w="9525">
                     <a:solidFill>
                       <a:srgbClr val="000000"/>
                     </a:solidFill>
@@ -10297,7 +10297,7 @@
               </a:ln>
               <a:extLst>
                 <a:ext uri="{91240B29-F687-4f45-9708-019B960494DF}">
-                  <a14:hiddenLine xmlns="" xmlns:a14="http://schemas.microsoft.com/office/drawing/2010/main" w="9525">
+                  <a14:hiddenLine xmlns:a14="http://schemas.microsoft.com/office/drawing/2010/main" xmlns="" w="9525">
                     <a:solidFill>
                       <a:srgbClr val="000000"/>
                     </a:solidFill>
@@ -10362,7 +10362,7 @@
               </a:ln>
               <a:extLst>
                 <a:ext uri="{91240B29-F687-4f45-9708-019B960494DF}">
-                  <a14:hiddenLine xmlns="" xmlns:a14="http://schemas.microsoft.com/office/drawing/2010/main" w="9525">
+                  <a14:hiddenLine xmlns:a14="http://schemas.microsoft.com/office/drawing/2010/main" xmlns="" w="9525">
                     <a:solidFill>
                       <a:srgbClr val="000000"/>
                     </a:solidFill>
@@ -10452,7 +10452,7 @@
               </a:ln>
               <a:extLst>
                 <a:ext uri="{91240B29-F687-4f45-9708-019B960494DF}">
-                  <a14:hiddenLine xmlns="" xmlns:a14="http://schemas.microsoft.com/office/drawing/2010/main" w="9525">
+                  <a14:hiddenLine xmlns:a14="http://schemas.microsoft.com/office/drawing/2010/main" xmlns="" w="9525">
                     <a:solidFill>
                       <a:srgbClr val="000000"/>
                     </a:solidFill>
@@ -10514,7 +10514,7 @@
               </a:ln>
               <a:extLst>
                 <a:ext uri="{91240B29-F687-4f45-9708-019B960494DF}">
-                  <a14:hiddenLine xmlns="" xmlns:a14="http://schemas.microsoft.com/office/drawing/2010/main" w="9525">
+                  <a14:hiddenLine xmlns:a14="http://schemas.microsoft.com/office/drawing/2010/main" xmlns="" w="9525">
                     <a:solidFill>
                       <a:srgbClr val="000000"/>
                     </a:solidFill>
@@ -10604,7 +10604,7 @@
               </a:ln>
               <a:extLst>
                 <a:ext uri="{91240B29-F687-4f45-9708-019B960494DF}">
-                  <a14:hiddenLine xmlns="" xmlns:a14="http://schemas.microsoft.com/office/drawing/2010/main" w="9525">
+                  <a14:hiddenLine xmlns:a14="http://schemas.microsoft.com/office/drawing/2010/main" xmlns="" w="9525">
                     <a:solidFill>
                       <a:srgbClr val="000000"/>
                     </a:solidFill>
@@ -10669,7 +10669,7 @@
               </a:ln>
               <a:extLst>
                 <a:ext uri="{91240B29-F687-4f45-9708-019B960494DF}">
-                  <a14:hiddenLine xmlns="" xmlns:a14="http://schemas.microsoft.com/office/drawing/2010/main" w="9525">
+                  <a14:hiddenLine xmlns:a14="http://schemas.microsoft.com/office/drawing/2010/main" xmlns="" w="9525">
                     <a:solidFill>
                       <a:srgbClr val="000000"/>
                     </a:solidFill>
@@ -10731,7 +10731,7 @@
               </a:ln>
               <a:extLst>
                 <a:ext uri="{91240B29-F687-4f45-9708-019B960494DF}">
-                  <a14:hiddenLine xmlns="" xmlns:a14="http://schemas.microsoft.com/office/drawing/2010/main" w="9525">
+                  <a14:hiddenLine xmlns:a14="http://schemas.microsoft.com/office/drawing/2010/main" xmlns="" w="9525">
                     <a:solidFill>
                       <a:srgbClr val="000000"/>
                     </a:solidFill>
@@ -10821,7 +10821,7 @@
               </a:ln>
               <a:extLst>
                 <a:ext uri="{91240B29-F687-4f45-9708-019B960494DF}">
-                  <a14:hiddenLine xmlns="" xmlns:a14="http://schemas.microsoft.com/office/drawing/2010/main" w="9525">
+                  <a14:hiddenLine xmlns:a14="http://schemas.microsoft.com/office/drawing/2010/main" xmlns="" w="9525">
                     <a:solidFill>
                       <a:srgbClr val="000000"/>
                     </a:solidFill>
@@ -10911,7 +10911,7 @@
               </a:ln>
               <a:extLst>
                 <a:ext uri="{91240B29-F687-4f45-9708-019B960494DF}">
-                  <a14:hiddenLine xmlns="" xmlns:a14="http://schemas.microsoft.com/office/drawing/2010/main" w="9525">
+                  <a14:hiddenLine xmlns:a14="http://schemas.microsoft.com/office/drawing/2010/main" xmlns="" w="9525">
                     <a:solidFill>
                       <a:srgbClr val="000000"/>
                     </a:solidFill>
@@ -10976,7 +10976,7 @@
               </a:ln>
               <a:extLst>
                 <a:ext uri="{91240B29-F687-4f45-9708-019B960494DF}">
-                  <a14:hiddenLine xmlns="" xmlns:a14="http://schemas.microsoft.com/office/drawing/2010/main" w="9525">
+                  <a14:hiddenLine xmlns:a14="http://schemas.microsoft.com/office/drawing/2010/main" xmlns="" w="9525">
                     <a:solidFill>
                       <a:srgbClr val="000000"/>
                     </a:solidFill>
@@ -11096,7 +11096,7 @@
               </a:ln>
               <a:extLst>
                 <a:ext uri="{91240B29-F687-4f45-9708-019B960494DF}">
-                  <a14:hiddenLine xmlns="" xmlns:a14="http://schemas.microsoft.com/office/drawing/2010/main" w="9525">
+                  <a14:hiddenLine xmlns:a14="http://schemas.microsoft.com/office/drawing/2010/main" xmlns="" w="9525">
                     <a:solidFill>
                       <a:srgbClr val="000000"/>
                     </a:solidFill>
@@ -11177,7 +11177,7 @@
               </a:ln>
               <a:extLst>
                 <a:ext uri="{91240B29-F687-4f45-9708-019B960494DF}">
-                  <a14:hiddenLine xmlns="" xmlns:a14="http://schemas.microsoft.com/office/drawing/2010/main" w="9525">
+                  <a14:hiddenLine xmlns:a14="http://schemas.microsoft.com/office/drawing/2010/main" xmlns="" w="9525">
                     <a:solidFill>
                       <a:srgbClr val="000000"/>
                     </a:solidFill>
@@ -11292,7 +11292,7 @@
               </a:ln>
               <a:extLst>
                 <a:ext uri="{91240B29-F687-4f45-9708-019B960494DF}">
-                  <a14:hiddenLine xmlns="" xmlns:a14="http://schemas.microsoft.com/office/drawing/2010/main" w="9525">
+                  <a14:hiddenLine xmlns:a14="http://schemas.microsoft.com/office/drawing/2010/main" xmlns="" w="9525">
                     <a:solidFill>
                       <a:srgbClr val="000000"/>
                     </a:solidFill>
@@ -11382,7 +11382,7 @@
               </a:ln>
               <a:extLst>
                 <a:ext uri="{91240B29-F687-4f45-9708-019B960494DF}">
-                  <a14:hiddenLine xmlns="" xmlns:a14="http://schemas.microsoft.com/office/drawing/2010/main" w="9525">
+                  <a14:hiddenLine xmlns:a14="http://schemas.microsoft.com/office/drawing/2010/main" xmlns="" w="9525">
                     <a:solidFill>
                       <a:srgbClr val="000000"/>
                     </a:solidFill>
@@ -11447,7 +11447,7 @@
               </a:ln>
               <a:extLst>
                 <a:ext uri="{91240B29-F687-4f45-9708-019B960494DF}">
-                  <a14:hiddenLine xmlns="" xmlns:a14="http://schemas.microsoft.com/office/drawing/2010/main" w="9525">
+                  <a14:hiddenLine xmlns:a14="http://schemas.microsoft.com/office/drawing/2010/main" xmlns="" w="9525">
                     <a:solidFill>
                       <a:srgbClr val="000000"/>
                     </a:solidFill>
@@ -11537,7 +11537,7 @@
               </a:ln>
               <a:extLst>
                 <a:ext uri="{91240B29-F687-4f45-9708-019B960494DF}">
-                  <a14:hiddenLine xmlns="" xmlns:a14="http://schemas.microsoft.com/office/drawing/2010/main" w="9525">
+                  <a14:hiddenLine xmlns:a14="http://schemas.microsoft.com/office/drawing/2010/main" xmlns="" w="9525">
                     <a:solidFill>
                       <a:srgbClr val="000000"/>
                     </a:solidFill>
@@ -11605,7 +11605,7 @@
               </a:ln>
               <a:extLst>
                 <a:ext uri="{91240B29-F687-4f45-9708-019B960494DF}">
-                  <a14:hiddenLine xmlns="" xmlns:a14="http://schemas.microsoft.com/office/drawing/2010/main" w="9525">
+                  <a14:hiddenLine xmlns:a14="http://schemas.microsoft.com/office/drawing/2010/main" xmlns="" w="9525">
                     <a:solidFill>
                       <a:srgbClr val="000000"/>
                     </a:solidFill>
@@ -11695,7 +11695,7 @@
               </a:ln>
               <a:extLst>
                 <a:ext uri="{91240B29-F687-4f45-9708-019B960494DF}">
-                  <a14:hiddenLine xmlns="" xmlns:a14="http://schemas.microsoft.com/office/drawing/2010/main" w="9525">
+                  <a14:hiddenLine xmlns:a14="http://schemas.microsoft.com/office/drawing/2010/main" xmlns="" w="9525">
                     <a:solidFill>
                       <a:srgbClr val="000000"/>
                     </a:solidFill>
@@ -11763,7 +11763,7 @@
               </a:ln>
               <a:extLst>
                 <a:ext uri="{91240B29-F687-4f45-9708-019B960494DF}">
-                  <a14:hiddenLine xmlns="" xmlns:a14="http://schemas.microsoft.com/office/drawing/2010/main" w="9525">
+                  <a14:hiddenLine xmlns:a14="http://schemas.microsoft.com/office/drawing/2010/main" xmlns="" w="9525">
                     <a:solidFill>
                       <a:srgbClr val="000000"/>
                     </a:solidFill>
@@ -11853,7 +11853,7 @@
               </a:ln>
               <a:extLst>
                 <a:ext uri="{91240B29-F687-4f45-9708-019B960494DF}">
-                  <a14:hiddenLine xmlns="" xmlns:a14="http://schemas.microsoft.com/office/drawing/2010/main" w="9525">
+                  <a14:hiddenLine xmlns:a14="http://schemas.microsoft.com/office/drawing/2010/main" xmlns="" w="9525">
                     <a:solidFill>
                       <a:srgbClr val="000000"/>
                     </a:solidFill>
@@ -11887,7 +11887,7 @@
               </a:ln>
               <a:extLst>
                 <a:ext uri="{91240B29-F687-4f45-9708-019B960494DF}">
-                  <a14:hiddenLine xmlns="" xmlns:a14="http://schemas.microsoft.com/office/drawing/2010/main" w="9525">
+                  <a14:hiddenLine xmlns:a14="http://schemas.microsoft.com/office/drawing/2010/main" xmlns="" w="9525">
                     <a:solidFill>
                       <a:srgbClr val="000000"/>
                     </a:solidFill>
@@ -12027,7 +12027,7 @@
           <a:p>
             <a:fld id="{C92431A8-17CE-4556-BA8C-872543424DAF}" type="datetimeFigureOut">
               <a:rPr lang="en-NZ" smtClean="0"/>
-              <a:t>9/06/2023</a:t>
+              <a:t>10/06/2023</a:t>
             </a:fld>
             <a:endParaRPr lang="en-NZ"/>
           </a:p>
@@ -13860,40 +13860,15 @@
           </a:p>
           <a:p>
             <a:r>
-              <a:rPr lang="en-US" dirty="0"/>
-              <a:t>A QR code is like a </a:t>
-            </a:r>
-            <a:r>
-              <a:rPr lang="en-US" b="1" dirty="0"/>
-              <a:t>funny-looking puzzle</a:t>
-            </a:r>
-            <a:r>
-              <a:rPr lang="en-US" dirty="0"/>
-              <a:t>.</a:t>
+              <a:rPr lang="en-NZ" dirty="0"/>
+              <a:t>Fun facts</a:t>
             </a:r>
           </a:p>
           <a:p>
-            <a:r>
-              <a:rPr lang="en-US" dirty="0"/>
-              <a:t>A QR like a </a:t>
-            </a:r>
-            <a:r>
-              <a:rPr lang="en-US" b="1" dirty="0"/>
-              <a:t>high-tech treasure map </a:t>
-            </a:r>
-            <a:r>
-              <a:rPr lang="en-US" dirty="0"/>
-              <a:t>that your phone can read, leading you to exciting online adventures and hidden surprises!</a:t>
-            </a:r>
-          </a:p>
-          <a:p>
+            <a:pPr marL="0" indent="0">
+              <a:buNone/>
+            </a:pPr>
             <a:endParaRPr lang="en-NZ" dirty="0"/>
-          </a:p>
-          <a:p>
-            <a:r>
-              <a:rPr lang="en-NZ" dirty="0"/>
-              <a:t>Can human able to read QR code?</a:t>
-            </a:r>
           </a:p>
         </p:txBody>
       </p:sp>
@@ -13918,7 +13893,7 @@
         </p:blipFill>
         <p:spPr>
           <a:xfrm>
-            <a:off x="7124601" y="4906100"/>
+            <a:off x="1413612" y="526606"/>
             <a:ext cx="1390750" cy="1347216"/>
           </a:xfrm>
           <a:prstGeom prst="rect">
@@ -13926,6 +13901,332 @@
           </a:prstGeom>
         </p:spPr>
       </p:pic>
+      <p:grpSp>
+        <p:nvGrpSpPr>
+          <p:cNvPr id="15" name="Group 14">
+            <a:extLst>
+              <a:ext uri="{FF2B5EF4-FFF2-40B4-BE49-F238E27FC236}">
+                <a16:creationId xmlns:a16="http://schemas.microsoft.com/office/drawing/2014/main" id="{27CFF1EE-8508-4F24-3D93-42A161D3C708}"/>
+              </a:ext>
+            </a:extLst>
+          </p:cNvPr>
+          <p:cNvGrpSpPr/>
+          <p:nvPr/>
+        </p:nvGrpSpPr>
+        <p:grpSpPr>
+          <a:xfrm>
+            <a:off x="3464820" y="2490865"/>
+            <a:ext cx="1634897" cy="2171321"/>
+            <a:chOff x="3464820" y="2490865"/>
+            <a:chExt cx="1634897" cy="2171321"/>
+          </a:xfrm>
+        </p:grpSpPr>
+        <p:pic>
+          <p:nvPicPr>
+            <p:cNvPr id="1026" name="Picture 2" descr="Little Character Is Thinking Under Question Marks Doubts And Questions  Concepts Problem Solving Vector Doodle Illustration Stock Illustration -  Download Image Now - iStock">
+              <a:extLst>
+                <a:ext uri="{FF2B5EF4-FFF2-40B4-BE49-F238E27FC236}">
+                  <a16:creationId xmlns:a16="http://schemas.microsoft.com/office/drawing/2014/main" id="{B4F5817E-2891-C5D9-B348-18F1D75E643A}"/>
+                </a:ext>
+              </a:extLst>
+            </p:cNvPr>
+            <p:cNvPicPr>
+              <a:picLocks noChangeAspect="1" noChangeArrowheads="1"/>
+            </p:cNvPicPr>
+            <p:nvPr/>
+          </p:nvPicPr>
+          <p:blipFill>
+            <a:blip r:embed="rId3">
+              <a:extLst>
+                <a:ext uri="{28A0092B-C50C-407E-A947-70E740481C1C}">
+                  <a14:useLocalDpi xmlns:a14="http://schemas.microsoft.com/office/drawing/2010/main" val="0"/>
+                </a:ext>
+              </a:extLst>
+            </a:blip>
+            <a:srcRect/>
+            <a:stretch>
+              <a:fillRect/>
+            </a:stretch>
+          </p:blipFill>
+          <p:spPr bwMode="auto">
+            <a:xfrm>
+              <a:off x="3708966" y="2490865"/>
+              <a:ext cx="1390751" cy="1390751"/>
+            </a:xfrm>
+            <a:prstGeom prst="rect">
+              <a:avLst/>
+            </a:prstGeom>
+            <a:noFill/>
+            <a:extLst>
+              <a:ext uri="{909E8E84-426E-40DD-AFC4-6F175D3DCCD1}">
+                <a14:hiddenFill xmlns:a14="http://schemas.microsoft.com/office/drawing/2010/main">
+                  <a:solidFill>
+                    <a:srgbClr val="FFFFFF"/>
+                  </a:solidFill>
+                </a14:hiddenFill>
+              </a:ext>
+            </a:extLst>
+          </p:spPr>
+        </p:pic>
+        <p:sp>
+          <p:nvSpPr>
+            <p:cNvPr id="5" name="TextBox 4">
+              <a:extLst>
+                <a:ext uri="{FF2B5EF4-FFF2-40B4-BE49-F238E27FC236}">
+                  <a16:creationId xmlns:a16="http://schemas.microsoft.com/office/drawing/2014/main" id="{554E6126-6996-9F2F-4CF7-A19FFE83CEAE}"/>
+                </a:ext>
+              </a:extLst>
+            </p:cNvPr>
+            <p:cNvSpPr txBox="1"/>
+            <p:nvPr/>
+          </p:nvSpPr>
+          <p:spPr>
+            <a:xfrm>
+              <a:off x="3464820" y="4015855"/>
+              <a:ext cx="1131243" cy="646331"/>
+            </a:xfrm>
+            <a:prstGeom prst="rect">
+              <a:avLst/>
+            </a:prstGeom>
+            <a:noFill/>
+          </p:spPr>
+          <p:txBody>
+            <a:bodyPr wrap="square" rtlCol="0">
+              <a:spAutoFit/>
+            </a:bodyPr>
+            <a:lstStyle/>
+            <a:p>
+              <a:r>
+                <a:rPr lang="en-US" dirty="0"/>
+                <a:t>Humans can’t read</a:t>
+              </a:r>
+              <a:endParaRPr lang="en-NZ" dirty="0"/>
+            </a:p>
+          </p:txBody>
+        </p:sp>
+      </p:grpSp>
+      <p:pic>
+        <p:nvPicPr>
+          <p:cNvPr id="7" name="Picture 6">
+            <a:extLst>
+              <a:ext uri="{FF2B5EF4-FFF2-40B4-BE49-F238E27FC236}">
+                <a16:creationId xmlns:a16="http://schemas.microsoft.com/office/drawing/2014/main" id="{50749BB3-039F-BA7F-44B3-3F34AF385D57}"/>
+              </a:ext>
+            </a:extLst>
+          </p:cNvPr>
+          <p:cNvPicPr>
+            <a:picLocks noChangeAspect="1"/>
+          </p:cNvPicPr>
+          <p:nvPr/>
+        </p:nvPicPr>
+        <p:blipFill rotWithShape="1">
+          <a:blip r:embed="rId2"/>
+          <a:srcRect t="3796" r="2673"/>
+          <a:stretch/>
+        </p:blipFill>
+        <p:spPr>
+          <a:xfrm>
+            <a:off x="5619810" y="2512633"/>
+            <a:ext cx="1390750" cy="1347216"/>
+          </a:xfrm>
+          <a:prstGeom prst="rect">
+            <a:avLst/>
+          </a:prstGeom>
+        </p:spPr>
+      </p:pic>
+      <p:sp>
+        <p:nvSpPr>
+          <p:cNvPr id="8" name="TextBox 7">
+            <a:extLst>
+              <a:ext uri="{FF2B5EF4-FFF2-40B4-BE49-F238E27FC236}">
+                <a16:creationId xmlns:a16="http://schemas.microsoft.com/office/drawing/2014/main" id="{0EDB4122-D5EE-8C76-51A0-3EF3FD20BC88}"/>
+              </a:ext>
+            </a:extLst>
+          </p:cNvPr>
+          <p:cNvSpPr txBox="1"/>
+          <p:nvPr/>
+        </p:nvSpPr>
+        <p:spPr>
+          <a:xfrm>
+            <a:off x="5365487" y="3991701"/>
+            <a:ext cx="1390750" cy="646331"/>
+          </a:xfrm>
+          <a:prstGeom prst="rect">
+            <a:avLst/>
+          </a:prstGeom>
+          <a:noFill/>
+        </p:spPr>
+        <p:txBody>
+          <a:bodyPr wrap="square" rtlCol="0">
+            <a:spAutoFit/>
+          </a:bodyPr>
+          <a:lstStyle/>
+          <a:p>
+            <a:r>
+              <a:rPr lang="en-US" dirty="0"/>
+              <a:t>Rotate and it works</a:t>
+            </a:r>
+            <a:endParaRPr lang="en-NZ" dirty="0"/>
+          </a:p>
+        </p:txBody>
+      </p:sp>
+      <p:pic>
+        <p:nvPicPr>
+          <p:cNvPr id="9" name="Picture 8">
+            <a:extLst>
+              <a:ext uri="{FF2B5EF4-FFF2-40B4-BE49-F238E27FC236}">
+                <a16:creationId xmlns:a16="http://schemas.microsoft.com/office/drawing/2014/main" id="{98A68A63-2A0A-5A3C-F648-8BA5D6066448}"/>
+              </a:ext>
+            </a:extLst>
+          </p:cNvPr>
+          <p:cNvPicPr>
+            <a:picLocks noChangeAspect="1"/>
+          </p:cNvPicPr>
+          <p:nvPr/>
+        </p:nvPicPr>
+        <p:blipFill rotWithShape="1">
+          <a:blip r:embed="rId2"/>
+          <a:srcRect t="3796" r="2673"/>
+          <a:stretch/>
+        </p:blipFill>
+        <p:spPr>
+          <a:xfrm>
+            <a:off x="7502569" y="2580692"/>
+            <a:ext cx="1390750" cy="1347216"/>
+          </a:xfrm>
+          <a:prstGeom prst="rect">
+            <a:avLst/>
+          </a:prstGeom>
+        </p:spPr>
+      </p:pic>
+      <p:sp>
+        <p:nvSpPr>
+          <p:cNvPr id="10" name="Rectangle 9">
+            <a:extLst>
+              <a:ext uri="{FF2B5EF4-FFF2-40B4-BE49-F238E27FC236}">
+                <a16:creationId xmlns:a16="http://schemas.microsoft.com/office/drawing/2014/main" id="{EDD492A3-6373-8921-22CD-2F3C9FE2BBC8}"/>
+              </a:ext>
+            </a:extLst>
+          </p:cNvPr>
+          <p:cNvSpPr/>
+          <p:nvPr/>
+        </p:nvSpPr>
+        <p:spPr>
+          <a:xfrm>
+            <a:off x="8391261" y="2944291"/>
+            <a:ext cx="192024" cy="201168"/>
+          </a:xfrm>
+          <a:prstGeom prst="rect">
+            <a:avLst/>
+          </a:prstGeom>
+        </p:spPr>
+        <p:style>
+          <a:lnRef idx="2">
+            <a:schemeClr val="accent5">
+              <a:shade val="15000"/>
+            </a:schemeClr>
+          </a:lnRef>
+          <a:fillRef idx="1">
+            <a:schemeClr val="accent5"/>
+          </a:fillRef>
+          <a:effectRef idx="0">
+            <a:schemeClr val="accent5"/>
+          </a:effectRef>
+          <a:fontRef idx="minor">
+            <a:schemeClr val="lt1"/>
+          </a:fontRef>
+        </p:style>
+        <p:txBody>
+          <a:bodyPr rtlCol="0" anchor="ctr"/>
+          <a:lstStyle/>
+          <a:p>
+            <a:pPr algn="ctr"/>
+            <a:endParaRPr lang="en-NZ"/>
+          </a:p>
+        </p:txBody>
+      </p:sp>
+      <p:sp>
+        <p:nvSpPr>
+          <p:cNvPr id="12" name="Rectangle 11">
+            <a:extLst>
+              <a:ext uri="{FF2B5EF4-FFF2-40B4-BE49-F238E27FC236}">
+                <a16:creationId xmlns:a16="http://schemas.microsoft.com/office/drawing/2014/main" id="{C25E29C3-44D9-B6F6-28B7-C99AF204FB1F}"/>
+              </a:ext>
+            </a:extLst>
+          </p:cNvPr>
+          <p:cNvSpPr/>
+          <p:nvPr/>
+        </p:nvSpPr>
+        <p:spPr>
+          <a:xfrm>
+            <a:off x="7947021" y="3473756"/>
+            <a:ext cx="192024" cy="201168"/>
+          </a:xfrm>
+          <a:prstGeom prst="rect">
+            <a:avLst/>
+          </a:prstGeom>
+        </p:spPr>
+        <p:style>
+          <a:lnRef idx="2">
+            <a:schemeClr val="accent5">
+              <a:shade val="15000"/>
+            </a:schemeClr>
+          </a:lnRef>
+          <a:fillRef idx="1">
+            <a:schemeClr val="accent5"/>
+          </a:fillRef>
+          <a:effectRef idx="0">
+            <a:schemeClr val="accent5"/>
+          </a:effectRef>
+          <a:fontRef idx="minor">
+            <a:schemeClr val="lt1"/>
+          </a:fontRef>
+        </p:style>
+        <p:txBody>
+          <a:bodyPr rtlCol="0" anchor="ctr"/>
+          <a:lstStyle/>
+          <a:p>
+            <a:pPr algn="ctr"/>
+            <a:endParaRPr lang="en-NZ"/>
+          </a:p>
+        </p:txBody>
+      </p:sp>
+      <p:sp>
+        <p:nvSpPr>
+          <p:cNvPr id="14" name="TextBox 13">
+            <a:extLst>
+              <a:ext uri="{FF2B5EF4-FFF2-40B4-BE49-F238E27FC236}">
+                <a16:creationId xmlns:a16="http://schemas.microsoft.com/office/drawing/2014/main" id="{60B08D31-37BA-4569-E141-445616872D4F}"/>
+              </a:ext>
+            </a:extLst>
+          </p:cNvPr>
+          <p:cNvSpPr txBox="1"/>
+          <p:nvPr/>
+        </p:nvSpPr>
+        <p:spPr>
+          <a:xfrm>
+            <a:off x="7590512" y="4015855"/>
+            <a:ext cx="1390750" cy="646331"/>
+          </a:xfrm>
+          <a:prstGeom prst="rect">
+            <a:avLst/>
+          </a:prstGeom>
+          <a:noFill/>
+        </p:spPr>
+        <p:txBody>
+          <a:bodyPr wrap="square" rtlCol="0">
+            <a:spAutoFit/>
+          </a:bodyPr>
+          <a:lstStyle/>
+          <a:p>
+            <a:r>
+              <a:rPr lang="en-US" dirty="0"/>
+              <a:t>Some Noise no problem</a:t>
+            </a:r>
+            <a:endParaRPr lang="en-NZ" dirty="0"/>
+          </a:p>
+        </p:txBody>
+      </p:sp>
     </p:spTree>
     <p:extLst>
       <p:ext uri="{BB962C8B-B14F-4D97-AF65-F5344CB8AC3E}">
@@ -14068,11 +14369,7 @@
                                           </p:stCondLst>
                                         </p:cTn>
                                         <p:tgtEl>
-                                          <p:spTgt spid="3">
-                                            <p:txEl>
-                                              <p:pRg st="2" end="2"/>
-                                            </p:txEl>
-                                          </p:spTgt>
+                                          <p:spTgt spid="15"/>
                                         </p:tgtEl>
                                         <p:attrNameLst>
                                           <p:attrName>style.visibility</p:attrName>
@@ -14117,11 +14414,216 @@
                                           </p:stCondLst>
                                         </p:cTn>
                                         <p:tgtEl>
-                                          <p:spTgt spid="3">
-                                            <p:txEl>
-                                              <p:pRg st="4" end="4"/>
-                                            </p:txEl>
-                                          </p:spTgt>
+                                          <p:spTgt spid="7"/>
+                                        </p:tgtEl>
+                                        <p:attrNameLst>
+                                          <p:attrName>style.visibility</p:attrName>
+                                        </p:attrNameLst>
+                                      </p:cBhvr>
+                                      <p:to>
+                                        <p:strVal val="visible"/>
+                                      </p:to>
+                                    </p:set>
+                                  </p:childTnLst>
+                                </p:cTn>
+                              </p:par>
+                              <p:par>
+                                <p:cTn id="19" presetID="1" presetClass="entr" presetSubtype="0" fill="hold" grpId="0" nodeType="withEffect">
+                                  <p:stCondLst>
+                                    <p:cond delay="0"/>
+                                  </p:stCondLst>
+                                  <p:childTnLst>
+                                    <p:set>
+                                      <p:cBhvr>
+                                        <p:cTn id="20" dur="1" fill="hold">
+                                          <p:stCondLst>
+                                            <p:cond delay="0"/>
+                                          </p:stCondLst>
+                                        </p:cTn>
+                                        <p:tgtEl>
+                                          <p:spTgt spid="8"/>
+                                        </p:tgtEl>
+                                        <p:attrNameLst>
+                                          <p:attrName>style.visibility</p:attrName>
+                                        </p:attrNameLst>
+                                      </p:cBhvr>
+                                      <p:to>
+                                        <p:strVal val="visible"/>
+                                      </p:to>
+                                    </p:set>
+                                  </p:childTnLst>
+                                </p:cTn>
+                              </p:par>
+                            </p:childTnLst>
+                          </p:cTn>
+                        </p:par>
+                      </p:childTnLst>
+                    </p:cTn>
+                  </p:par>
+                  <p:par>
+                    <p:cTn id="21" fill="hold">
+                      <p:stCondLst>
+                        <p:cond delay="indefinite"/>
+                      </p:stCondLst>
+                      <p:childTnLst>
+                        <p:par>
+                          <p:cTn id="22" fill="hold">
+                            <p:stCondLst>
+                              <p:cond delay="0"/>
+                            </p:stCondLst>
+                            <p:childTnLst>
+                              <p:par>
+                                <p:cTn id="23" presetID="8" presetClass="emph" presetSubtype="0" fill="hold" nodeType="clickEffect">
+                                  <p:stCondLst>
+                                    <p:cond delay="0"/>
+                                  </p:stCondLst>
+                                  <p:childTnLst>
+                                    <p:animRot by="21600000">
+                                      <p:cBhvr>
+                                        <p:cTn id="24" dur="3000" fill="hold"/>
+                                        <p:tgtEl>
+                                          <p:spTgt spid="7"/>
+                                        </p:tgtEl>
+                                        <p:attrNameLst>
+                                          <p:attrName>r</p:attrName>
+                                        </p:attrNameLst>
+                                      </p:cBhvr>
+                                    </p:animRot>
+                                  </p:childTnLst>
+                                </p:cTn>
+                              </p:par>
+                            </p:childTnLst>
+                          </p:cTn>
+                        </p:par>
+                      </p:childTnLst>
+                    </p:cTn>
+                  </p:par>
+                  <p:par>
+                    <p:cTn id="25" fill="hold">
+                      <p:stCondLst>
+                        <p:cond delay="indefinite"/>
+                      </p:stCondLst>
+                      <p:childTnLst>
+                        <p:par>
+                          <p:cTn id="26" fill="hold">
+                            <p:stCondLst>
+                              <p:cond delay="0"/>
+                            </p:stCondLst>
+                            <p:childTnLst>
+                              <p:par>
+                                <p:cTn id="27" presetID="1" presetClass="entr" presetSubtype="0" fill="hold" nodeType="clickEffect">
+                                  <p:stCondLst>
+                                    <p:cond delay="0"/>
+                                  </p:stCondLst>
+                                  <p:childTnLst>
+                                    <p:set>
+                                      <p:cBhvr>
+                                        <p:cTn id="28" dur="1" fill="hold">
+                                          <p:stCondLst>
+                                            <p:cond delay="0"/>
+                                          </p:stCondLst>
+                                        </p:cTn>
+                                        <p:tgtEl>
+                                          <p:spTgt spid="9"/>
+                                        </p:tgtEl>
+                                        <p:attrNameLst>
+                                          <p:attrName>style.visibility</p:attrName>
+                                        </p:attrNameLst>
+                                      </p:cBhvr>
+                                      <p:to>
+                                        <p:strVal val="visible"/>
+                                      </p:to>
+                                    </p:set>
+                                  </p:childTnLst>
+                                </p:cTn>
+                              </p:par>
+                              <p:par>
+                                <p:cTn id="29" presetID="1" presetClass="entr" presetSubtype="0" fill="hold" grpId="0" nodeType="withEffect">
+                                  <p:stCondLst>
+                                    <p:cond delay="0"/>
+                                  </p:stCondLst>
+                                  <p:childTnLst>
+                                    <p:set>
+                                      <p:cBhvr>
+                                        <p:cTn id="30" dur="1" fill="hold">
+                                          <p:stCondLst>
+                                            <p:cond delay="0"/>
+                                          </p:stCondLst>
+                                        </p:cTn>
+                                        <p:tgtEl>
+                                          <p:spTgt spid="14"/>
+                                        </p:tgtEl>
+                                        <p:attrNameLst>
+                                          <p:attrName>style.visibility</p:attrName>
+                                        </p:attrNameLst>
+                                      </p:cBhvr>
+                                      <p:to>
+                                        <p:strVal val="visible"/>
+                                      </p:to>
+                                    </p:set>
+                                  </p:childTnLst>
+                                </p:cTn>
+                              </p:par>
+                            </p:childTnLst>
+                          </p:cTn>
+                        </p:par>
+                      </p:childTnLst>
+                    </p:cTn>
+                  </p:par>
+                  <p:par>
+                    <p:cTn id="31" fill="hold">
+                      <p:stCondLst>
+                        <p:cond delay="indefinite"/>
+                      </p:stCondLst>
+                      <p:childTnLst>
+                        <p:par>
+                          <p:cTn id="32" fill="hold">
+                            <p:stCondLst>
+                              <p:cond delay="0"/>
+                            </p:stCondLst>
+                            <p:childTnLst>
+                              <p:par>
+                                <p:cTn id="33" presetID="1" presetClass="entr" presetSubtype="0" fill="hold" grpId="0" nodeType="clickEffect">
+                                  <p:stCondLst>
+                                    <p:cond delay="0"/>
+                                  </p:stCondLst>
+                                  <p:childTnLst>
+                                    <p:set>
+                                      <p:cBhvr>
+                                        <p:cTn id="34" dur="1" fill="hold">
+                                          <p:stCondLst>
+                                            <p:cond delay="0"/>
+                                          </p:stCondLst>
+                                        </p:cTn>
+                                        <p:tgtEl>
+                                          <p:spTgt spid="12"/>
+                                        </p:tgtEl>
+                                        <p:attrNameLst>
+                                          <p:attrName>style.visibility</p:attrName>
+                                        </p:attrNameLst>
+                                      </p:cBhvr>
+                                      <p:to>
+                                        <p:strVal val="visible"/>
+                                      </p:to>
+                                    </p:set>
+                                  </p:childTnLst>
+                                </p:cTn>
+                              </p:par>
+                              <p:par>
+                                <p:cTn id="35" presetID="1" presetClass="entr" presetSubtype="0" fill="hold" grpId="0" nodeType="withEffect">
+                                  <p:stCondLst>
+                                    <p:cond delay="0"/>
+                                  </p:stCondLst>
+                                  <p:childTnLst>
+                                    <p:set>
+                                      <p:cBhvr>
+                                        <p:cTn id="36" dur="1" fill="hold">
+                                          <p:stCondLst>
+                                            <p:cond delay="0"/>
+                                          </p:stCondLst>
+                                        </p:cTn>
+                                        <p:tgtEl>
+                                          <p:spTgt spid="10"/>
                                         </p:tgtEl>
                                         <p:attrNameLst>
                                           <p:attrName>style.visibility</p:attrName>
@@ -14161,6 +14663,12 @@
         </p:cTn>
       </p:par>
     </p:tnLst>
+    <p:bldLst>
+      <p:bldP spid="8" grpId="0"/>
+      <p:bldP spid="10" grpId="0" animBg="1"/>
+      <p:bldP spid="12" grpId="0" animBg="1"/>
+      <p:bldP spid="14" grpId="0"/>
+    </p:bldLst>
   </p:timing>
 </p:sld>
 </file>
@@ -14350,7 +14858,7 @@
             <a:noFill/>
             <a:extLst>
               <a:ext uri="{909E8E84-426E-40dd-AFC4-6F175D3DCCD1}">
-                <a14:hiddenFill xmlns:p14="http://schemas.microsoft.com/office/powerpoint/2010/main" xmlns:a14="http://schemas.microsoft.com/office/drawing/2010/main" xmlns:a16="http://schemas.microsoft.com/office/drawing/2014/main" xmlns="">
+                <a14:hiddenFill xmlns="" xmlns:a16="http://schemas.microsoft.com/office/drawing/2014/main" xmlns:a14="http://schemas.microsoft.com/office/drawing/2010/main" xmlns:p14="http://schemas.microsoft.com/office/powerpoint/2010/main">
                   <a:solidFill>
                     <a:srgbClr val="FFFFFF"/>
                   </a:solidFill>
@@ -14390,7 +14898,7 @@
           <a:p>
             <a:r>
               <a:rPr lang="en-US" dirty="0"/>
-              <a:t>Rules &amp; Guidelines</a:t>
+              <a:t>Game Rules &amp; Guidelines</a:t>
             </a:r>
             <a:endParaRPr lang="en-NZ" dirty="0"/>
           </a:p>
@@ -14515,7 +15023,7 @@
             </a:ln>
             <a:extLst>
               <a:ext uri="{91240B29-F687-4f45-9708-019B960494DF}">
-                <a14:hiddenLine xmlns:p14="http://schemas.microsoft.com/office/powerpoint/2010/main" xmlns:a14="http://schemas.microsoft.com/office/drawing/2010/main" xmlns:a16="http://schemas.microsoft.com/office/drawing/2014/main" xmlns="" w="9525">
+                <a14:hiddenLine xmlns="" xmlns:a16="http://schemas.microsoft.com/office/drawing/2014/main" xmlns:a14="http://schemas.microsoft.com/office/drawing/2010/main" xmlns:p14="http://schemas.microsoft.com/office/powerpoint/2010/main" w="9525">
                   <a:solidFill>
                     <a:srgbClr val="000000"/>
                   </a:solidFill>
@@ -14620,7 +15128,7 @@
             </a:ln>
             <a:extLst>
               <a:ext uri="{91240B29-F687-4f45-9708-019B960494DF}">
-                <a14:hiddenLine xmlns:p14="http://schemas.microsoft.com/office/powerpoint/2010/main" xmlns:a14="http://schemas.microsoft.com/office/drawing/2010/main" xmlns:a16="http://schemas.microsoft.com/office/drawing/2014/main" xmlns="" w="9525">
+                <a14:hiddenLine xmlns="" xmlns:a16="http://schemas.microsoft.com/office/drawing/2014/main" xmlns:a14="http://schemas.microsoft.com/office/drawing/2010/main" xmlns:p14="http://schemas.microsoft.com/office/powerpoint/2010/main" w="9525">
                   <a:solidFill>
                     <a:srgbClr val="000000"/>
                   </a:solidFill>
@@ -14725,7 +15233,7 @@
             </a:ln>
             <a:extLst>
               <a:ext uri="{91240B29-F687-4f45-9708-019B960494DF}">
-                <a14:hiddenLine xmlns:p14="http://schemas.microsoft.com/office/powerpoint/2010/main" xmlns:a14="http://schemas.microsoft.com/office/drawing/2010/main" xmlns:a16="http://schemas.microsoft.com/office/drawing/2014/main" xmlns="" w="9525">
+                <a14:hiddenLine xmlns="" xmlns:a16="http://schemas.microsoft.com/office/drawing/2014/main" xmlns:a14="http://schemas.microsoft.com/office/drawing/2010/main" xmlns:p14="http://schemas.microsoft.com/office/powerpoint/2010/main" w="9525">
                   <a:solidFill>
                     <a:srgbClr val="000000"/>
                   </a:solidFill>
@@ -14774,7 +15282,7 @@
             </a:ln>
             <a:extLst>
               <a:ext uri="{91240B29-F687-4f45-9708-019B960494DF}">
-                <a14:hiddenLine xmlns:p14="http://schemas.microsoft.com/office/powerpoint/2010/main" xmlns:a14="http://schemas.microsoft.com/office/drawing/2010/main" xmlns:a16="http://schemas.microsoft.com/office/drawing/2014/main" xmlns="" w="9525">
+                <a14:hiddenLine xmlns="" xmlns:a16="http://schemas.microsoft.com/office/drawing/2014/main" xmlns:a14="http://schemas.microsoft.com/office/drawing/2010/main" xmlns:p14="http://schemas.microsoft.com/office/powerpoint/2010/main" w="9525">
                   <a:solidFill>
                     <a:srgbClr val="000000"/>
                   </a:solidFill>
@@ -14879,7 +15387,7 @@
             </a:ln>
             <a:extLst>
               <a:ext uri="{91240B29-F687-4f45-9708-019B960494DF}">
-                <a14:hiddenLine xmlns:p14="http://schemas.microsoft.com/office/powerpoint/2010/main" xmlns:a14="http://schemas.microsoft.com/office/drawing/2010/main" xmlns:a16="http://schemas.microsoft.com/office/drawing/2014/main" xmlns="" w="9525">
+                <a14:hiddenLine xmlns="" xmlns:a16="http://schemas.microsoft.com/office/drawing/2014/main" xmlns:a14="http://schemas.microsoft.com/office/drawing/2010/main" xmlns:p14="http://schemas.microsoft.com/office/powerpoint/2010/main" w="9525">
                   <a:solidFill>
                     <a:srgbClr val="000000"/>
                   </a:solidFill>
@@ -14956,7 +15464,7 @@
             </a:ln>
             <a:extLst>
               <a:ext uri="{91240B29-F687-4f45-9708-019B960494DF}">
-                <a14:hiddenLine xmlns:p14="http://schemas.microsoft.com/office/powerpoint/2010/main" xmlns:a14="http://schemas.microsoft.com/office/drawing/2010/main" xmlns:a16="http://schemas.microsoft.com/office/drawing/2014/main" xmlns="" w="9525">
+                <a14:hiddenLine xmlns="" xmlns:a16="http://schemas.microsoft.com/office/drawing/2014/main" xmlns:a14="http://schemas.microsoft.com/office/drawing/2010/main" xmlns:p14="http://schemas.microsoft.com/office/powerpoint/2010/main" w="9525">
                   <a:solidFill>
                     <a:srgbClr val="000000"/>
                   </a:solidFill>
@@ -15033,7 +15541,7 @@
             </a:ln>
             <a:extLst>
               <a:ext uri="{91240B29-F687-4f45-9708-019B960494DF}">
-                <a14:hiddenLine xmlns:p14="http://schemas.microsoft.com/office/powerpoint/2010/main" xmlns:a14="http://schemas.microsoft.com/office/drawing/2010/main" xmlns:a16="http://schemas.microsoft.com/office/drawing/2014/main" xmlns="" w="9525">
+                <a14:hiddenLine xmlns="" xmlns:a16="http://schemas.microsoft.com/office/drawing/2014/main" xmlns:a14="http://schemas.microsoft.com/office/drawing/2010/main" xmlns:p14="http://schemas.microsoft.com/office/powerpoint/2010/main" w="9525">
                   <a:solidFill>
                     <a:srgbClr val="000000"/>
                   </a:solidFill>
@@ -15138,7 +15646,7 @@
             </a:ln>
             <a:extLst>
               <a:ext uri="{91240B29-F687-4f45-9708-019B960494DF}">
-                <a14:hiddenLine xmlns:p14="http://schemas.microsoft.com/office/powerpoint/2010/main" xmlns:a14="http://schemas.microsoft.com/office/drawing/2010/main" xmlns:a16="http://schemas.microsoft.com/office/drawing/2014/main" xmlns="" w="9525">
+                <a14:hiddenLine xmlns="" xmlns:a16="http://schemas.microsoft.com/office/drawing/2014/main" xmlns:a14="http://schemas.microsoft.com/office/drawing/2010/main" xmlns:p14="http://schemas.microsoft.com/office/powerpoint/2010/main" w="9525">
                   <a:solidFill>
                     <a:srgbClr val="000000"/>
                   </a:solidFill>
@@ -15215,7 +15723,7 @@
             </a:ln>
             <a:extLst>
               <a:ext uri="{91240B29-F687-4f45-9708-019B960494DF}">
-                <a14:hiddenLine xmlns:p14="http://schemas.microsoft.com/office/powerpoint/2010/main" xmlns:a14="http://schemas.microsoft.com/office/drawing/2010/main" xmlns:a16="http://schemas.microsoft.com/office/drawing/2014/main" xmlns="" w="9525">
+                <a14:hiddenLine xmlns="" xmlns:a16="http://schemas.microsoft.com/office/drawing/2014/main" xmlns:a14="http://schemas.microsoft.com/office/drawing/2010/main" xmlns:p14="http://schemas.microsoft.com/office/powerpoint/2010/main" w="9525">
                   <a:solidFill>
                     <a:srgbClr val="000000"/>
                   </a:solidFill>
@@ -15292,7 +15800,7 @@
             </a:ln>
             <a:extLst>
               <a:ext uri="{91240B29-F687-4f45-9708-019B960494DF}">
-                <a14:hiddenLine xmlns:p14="http://schemas.microsoft.com/office/powerpoint/2010/main" xmlns:a14="http://schemas.microsoft.com/office/drawing/2010/main" xmlns:a16="http://schemas.microsoft.com/office/drawing/2014/main" xmlns="" w="9525">
+                <a14:hiddenLine xmlns="" xmlns:a16="http://schemas.microsoft.com/office/drawing/2014/main" xmlns:a14="http://schemas.microsoft.com/office/drawing/2010/main" xmlns:p14="http://schemas.microsoft.com/office/powerpoint/2010/main" w="9525">
                   <a:solidFill>
                     <a:srgbClr val="000000"/>
                   </a:solidFill>
@@ -15397,7 +15905,7 @@
             </a:ln>
             <a:extLst>
               <a:ext uri="{91240B29-F687-4f45-9708-019B960494DF}">
-                <a14:hiddenLine xmlns:p14="http://schemas.microsoft.com/office/powerpoint/2010/main" xmlns:a14="http://schemas.microsoft.com/office/drawing/2010/main" xmlns:a16="http://schemas.microsoft.com/office/drawing/2014/main" xmlns="" w="9525">
+                <a14:hiddenLine xmlns="" xmlns:a16="http://schemas.microsoft.com/office/drawing/2014/main" xmlns:a14="http://schemas.microsoft.com/office/drawing/2010/main" xmlns:p14="http://schemas.microsoft.com/office/powerpoint/2010/main" w="9525">
                   <a:solidFill>
                     <a:srgbClr val="000000"/>
                   </a:solidFill>
@@ -15502,7 +16010,7 @@
             </a:ln>
             <a:extLst>
               <a:ext uri="{91240B29-F687-4f45-9708-019B960494DF}">
-                <a14:hiddenLine xmlns:p14="http://schemas.microsoft.com/office/powerpoint/2010/main" xmlns:a14="http://schemas.microsoft.com/office/drawing/2010/main" xmlns:a16="http://schemas.microsoft.com/office/drawing/2014/main" xmlns="" w="9525">
+                <a14:hiddenLine xmlns="" xmlns:a16="http://schemas.microsoft.com/office/drawing/2014/main" xmlns:a14="http://schemas.microsoft.com/office/drawing/2010/main" xmlns:p14="http://schemas.microsoft.com/office/powerpoint/2010/main" w="9525">
                   <a:solidFill>
                     <a:srgbClr val="000000"/>
                   </a:solidFill>
@@ -15579,7 +16087,7 @@
             </a:ln>
             <a:extLst>
               <a:ext uri="{91240B29-F687-4f45-9708-019B960494DF}">
-                <a14:hiddenLine xmlns:p14="http://schemas.microsoft.com/office/powerpoint/2010/main" xmlns:a14="http://schemas.microsoft.com/office/drawing/2010/main" xmlns:a16="http://schemas.microsoft.com/office/drawing/2014/main" xmlns="" w="9525">
+                <a14:hiddenLine xmlns="" xmlns:a16="http://schemas.microsoft.com/office/drawing/2014/main" xmlns:a14="http://schemas.microsoft.com/office/drawing/2010/main" xmlns:p14="http://schemas.microsoft.com/office/powerpoint/2010/main" w="9525">
                   <a:solidFill>
                     <a:srgbClr val="000000"/>
                   </a:solidFill>
@@ -15704,7 +16212,7 @@
             </a:ln>
             <a:extLst>
               <a:ext uri="{91240B29-F687-4f45-9708-019B960494DF}">
-                <a14:hiddenLine xmlns:p14="http://schemas.microsoft.com/office/powerpoint/2010/main" xmlns:a14="http://schemas.microsoft.com/office/drawing/2010/main" xmlns:a16="http://schemas.microsoft.com/office/drawing/2014/main" xmlns="" w="9525">
+                <a14:hiddenLine xmlns="" xmlns:a16="http://schemas.microsoft.com/office/drawing/2014/main" xmlns:a14="http://schemas.microsoft.com/office/drawing/2010/main" xmlns:p14="http://schemas.microsoft.com/office/powerpoint/2010/main" w="9525">
                   <a:solidFill>
                     <a:srgbClr val="000000"/>
                   </a:solidFill>
@@ -15781,7 +16289,7 @@
             </a:ln>
             <a:extLst>
               <a:ext uri="{91240B29-F687-4f45-9708-019B960494DF}">
-                <a14:hiddenLine xmlns:p14="http://schemas.microsoft.com/office/powerpoint/2010/main" xmlns:a14="http://schemas.microsoft.com/office/drawing/2010/main" xmlns:a16="http://schemas.microsoft.com/office/drawing/2014/main" xmlns="" w="9525">
+                <a14:hiddenLine xmlns="" xmlns:a16="http://schemas.microsoft.com/office/drawing/2014/main" xmlns:a14="http://schemas.microsoft.com/office/drawing/2010/main" xmlns:p14="http://schemas.microsoft.com/office/powerpoint/2010/main" w="9525">
                   <a:solidFill>
                     <a:srgbClr val="000000"/>
                   </a:solidFill>
@@ -15886,7 +16394,7 @@
             </a:ln>
             <a:extLst>
               <a:ext uri="{91240B29-F687-4f45-9708-019B960494DF}">
-                <a14:hiddenLine xmlns:p14="http://schemas.microsoft.com/office/powerpoint/2010/main" xmlns:a14="http://schemas.microsoft.com/office/drawing/2010/main" xmlns:a16="http://schemas.microsoft.com/office/drawing/2014/main" xmlns="" w="9525">
+                <a14:hiddenLine xmlns="" xmlns:a16="http://schemas.microsoft.com/office/drawing/2014/main" xmlns:a14="http://schemas.microsoft.com/office/drawing/2010/main" xmlns:p14="http://schemas.microsoft.com/office/powerpoint/2010/main" w="9525">
                   <a:solidFill>
                     <a:srgbClr val="000000"/>
                   </a:solidFill>
@@ -15991,7 +16499,7 @@
             </a:ln>
             <a:extLst>
               <a:ext uri="{91240B29-F687-4f45-9708-019B960494DF}">
-                <a14:hiddenLine xmlns:p14="http://schemas.microsoft.com/office/powerpoint/2010/main" xmlns:a14="http://schemas.microsoft.com/office/drawing/2010/main" xmlns:a16="http://schemas.microsoft.com/office/drawing/2014/main" xmlns="" w="9525">
+                <a14:hiddenLine xmlns="" xmlns:a16="http://schemas.microsoft.com/office/drawing/2014/main" xmlns:a14="http://schemas.microsoft.com/office/drawing/2010/main" xmlns:p14="http://schemas.microsoft.com/office/powerpoint/2010/main" w="9525">
                   <a:solidFill>
                     <a:srgbClr val="000000"/>
                   </a:solidFill>
@@ -16068,7 +16576,7 @@
             </a:ln>
             <a:extLst>
               <a:ext uri="{91240B29-F687-4f45-9708-019B960494DF}">
-                <a14:hiddenLine xmlns:p14="http://schemas.microsoft.com/office/powerpoint/2010/main" xmlns:a14="http://schemas.microsoft.com/office/drawing/2010/main" xmlns:a16="http://schemas.microsoft.com/office/drawing/2014/main" xmlns="" w="9525">
+                <a14:hiddenLine xmlns="" xmlns:a16="http://schemas.microsoft.com/office/drawing/2014/main" xmlns:a14="http://schemas.microsoft.com/office/drawing/2010/main" xmlns:p14="http://schemas.microsoft.com/office/powerpoint/2010/main" w="9525">
                   <a:solidFill>
                     <a:srgbClr val="000000"/>
                   </a:solidFill>
@@ -16173,7 +16681,7 @@
             </a:ln>
             <a:extLst>
               <a:ext uri="{91240B29-F687-4f45-9708-019B960494DF}">
-                <a14:hiddenLine xmlns:p14="http://schemas.microsoft.com/office/powerpoint/2010/main" xmlns:a14="http://schemas.microsoft.com/office/drawing/2010/main" xmlns:a16="http://schemas.microsoft.com/office/drawing/2014/main" xmlns="" w="9525">
+                <a14:hiddenLine xmlns="" xmlns:a16="http://schemas.microsoft.com/office/drawing/2014/main" xmlns:a14="http://schemas.microsoft.com/office/drawing/2010/main" xmlns:p14="http://schemas.microsoft.com/office/powerpoint/2010/main" w="9525">
                   <a:solidFill>
                     <a:srgbClr val="000000"/>
                   </a:solidFill>
@@ -16278,7 +16786,7 @@
             </a:ln>
             <a:extLst>
               <a:ext uri="{91240B29-F687-4f45-9708-019B960494DF}">
-                <a14:hiddenLine xmlns:p14="http://schemas.microsoft.com/office/powerpoint/2010/main" xmlns:a14="http://schemas.microsoft.com/office/drawing/2010/main" xmlns:a16="http://schemas.microsoft.com/office/drawing/2014/main" xmlns="" w="9525">
+                <a14:hiddenLine xmlns="" xmlns:a16="http://schemas.microsoft.com/office/drawing/2014/main" xmlns:a14="http://schemas.microsoft.com/office/drawing/2010/main" xmlns:p14="http://schemas.microsoft.com/office/powerpoint/2010/main" w="9525">
                   <a:solidFill>
                     <a:srgbClr val="000000"/>
                   </a:solidFill>
@@ -16349,7 +16857,7 @@
             </a:ln>
             <a:extLst>
               <a:ext uri="{91240B29-F687-4f45-9708-019B960494DF}">
-                <a14:hiddenLine xmlns:p14="http://schemas.microsoft.com/office/powerpoint/2010/main" xmlns:a14="http://schemas.microsoft.com/office/drawing/2010/main" xmlns:a16="http://schemas.microsoft.com/office/drawing/2014/main" xmlns="" w="9525">
+                <a14:hiddenLine xmlns="" xmlns:a16="http://schemas.microsoft.com/office/drawing/2014/main" xmlns:a14="http://schemas.microsoft.com/office/drawing/2010/main" xmlns:p14="http://schemas.microsoft.com/office/powerpoint/2010/main" w="9525">
                   <a:solidFill>
                     <a:srgbClr val="000000"/>
                   </a:solidFill>
@@ -16454,7 +16962,7 @@
             </a:ln>
             <a:extLst>
               <a:ext uri="{91240B29-F687-4f45-9708-019B960494DF}">
-                <a14:hiddenLine xmlns:p14="http://schemas.microsoft.com/office/powerpoint/2010/main" xmlns:a14="http://schemas.microsoft.com/office/drawing/2010/main" xmlns:a16="http://schemas.microsoft.com/office/drawing/2014/main" xmlns="" w="9525">
+                <a14:hiddenLine xmlns="" xmlns:a16="http://schemas.microsoft.com/office/drawing/2014/main" xmlns:a14="http://schemas.microsoft.com/office/drawing/2010/main" xmlns:p14="http://schemas.microsoft.com/office/powerpoint/2010/main" w="9525">
                   <a:solidFill>
                     <a:srgbClr val="000000"/>
                   </a:solidFill>
@@ -16525,7 +17033,7 @@
             </a:ln>
             <a:extLst>
               <a:ext uri="{91240B29-F687-4f45-9708-019B960494DF}">
-                <a14:hiddenLine xmlns:p14="http://schemas.microsoft.com/office/powerpoint/2010/main" xmlns:a14="http://schemas.microsoft.com/office/drawing/2010/main" xmlns:a16="http://schemas.microsoft.com/office/drawing/2014/main" xmlns="" w="9525">
+                <a14:hiddenLine xmlns="" xmlns:a16="http://schemas.microsoft.com/office/drawing/2014/main" xmlns:a14="http://schemas.microsoft.com/office/drawing/2010/main" xmlns:p14="http://schemas.microsoft.com/office/powerpoint/2010/main" w="9525">
                   <a:solidFill>
                     <a:srgbClr val="000000"/>
                   </a:solidFill>
@@ -16630,7 +17138,7 @@
             </a:ln>
             <a:extLst>
               <a:ext uri="{91240B29-F687-4f45-9708-019B960494DF}">
-                <a14:hiddenLine xmlns:p14="http://schemas.microsoft.com/office/powerpoint/2010/main" xmlns:a14="http://schemas.microsoft.com/office/drawing/2010/main" xmlns:a16="http://schemas.microsoft.com/office/drawing/2014/main" xmlns="" w="9525">
+                <a14:hiddenLine xmlns="" xmlns:a16="http://schemas.microsoft.com/office/drawing/2014/main" xmlns:a14="http://schemas.microsoft.com/office/drawing/2010/main" xmlns:p14="http://schemas.microsoft.com/office/powerpoint/2010/main" w="9525">
                   <a:solidFill>
                     <a:srgbClr val="000000"/>
                   </a:solidFill>
@@ -16713,7 +17221,7 @@
             </a:ln>
             <a:extLst>
               <a:ext uri="{91240B29-F687-4f45-9708-019B960494DF}">
-                <a14:hiddenLine xmlns:p14="http://schemas.microsoft.com/office/powerpoint/2010/main" xmlns:a14="http://schemas.microsoft.com/office/drawing/2010/main" xmlns:a16="http://schemas.microsoft.com/office/drawing/2014/main" xmlns="" w="9525">
+                <a14:hiddenLine xmlns="" xmlns:a16="http://schemas.microsoft.com/office/drawing/2014/main" xmlns:a14="http://schemas.microsoft.com/office/drawing/2010/main" xmlns:p14="http://schemas.microsoft.com/office/powerpoint/2010/main" w="9525">
                   <a:solidFill>
                     <a:srgbClr val="000000"/>
                   </a:solidFill>
@@ -16818,7 +17326,7 @@
             </a:ln>
             <a:extLst>
               <a:ext uri="{91240B29-F687-4f45-9708-019B960494DF}">
-                <a14:hiddenLine xmlns:p14="http://schemas.microsoft.com/office/powerpoint/2010/main" xmlns:a14="http://schemas.microsoft.com/office/drawing/2010/main" xmlns:a16="http://schemas.microsoft.com/office/drawing/2014/main" xmlns="" w="9525">
+                <a14:hiddenLine xmlns="" xmlns:a16="http://schemas.microsoft.com/office/drawing/2014/main" xmlns:a14="http://schemas.microsoft.com/office/drawing/2010/main" xmlns:p14="http://schemas.microsoft.com/office/powerpoint/2010/main" w="9525">
                   <a:solidFill>
                     <a:srgbClr val="000000"/>
                   </a:solidFill>
@@ -16901,7 +17409,7 @@
             </a:ln>
             <a:extLst>
               <a:ext uri="{91240B29-F687-4f45-9708-019B960494DF}">
-                <a14:hiddenLine xmlns:p14="http://schemas.microsoft.com/office/powerpoint/2010/main" xmlns:a14="http://schemas.microsoft.com/office/drawing/2010/main" xmlns:a16="http://schemas.microsoft.com/office/drawing/2014/main" xmlns="" w="9525">
+                <a14:hiddenLine xmlns="" xmlns:a16="http://schemas.microsoft.com/office/drawing/2014/main" xmlns:a14="http://schemas.microsoft.com/office/drawing/2010/main" xmlns:p14="http://schemas.microsoft.com/office/powerpoint/2010/main" w="9525">
                   <a:solidFill>
                     <a:srgbClr val="000000"/>
                   </a:solidFill>
@@ -17006,7 +17514,7 @@
             </a:ln>
             <a:extLst>
               <a:ext uri="{91240B29-F687-4f45-9708-019B960494DF}">
-                <a14:hiddenLine xmlns:p14="http://schemas.microsoft.com/office/powerpoint/2010/main" xmlns:a14="http://schemas.microsoft.com/office/drawing/2010/main" xmlns:a16="http://schemas.microsoft.com/office/drawing/2014/main" xmlns="" w="9525">
+                <a14:hiddenLine xmlns="" xmlns:a16="http://schemas.microsoft.com/office/drawing/2014/main" xmlns:a14="http://schemas.microsoft.com/office/drawing/2010/main" xmlns:p14="http://schemas.microsoft.com/office/powerpoint/2010/main" w="9525">
                   <a:solidFill>
                     <a:srgbClr val="000000"/>
                   </a:solidFill>
@@ -17055,7 +17563,7 @@
             </a:ln>
             <a:extLst>
               <a:ext uri="{91240B29-F687-4f45-9708-019B960494DF}">
-                <a14:hiddenLine xmlns:p14="http://schemas.microsoft.com/office/powerpoint/2010/main" xmlns:a14="http://schemas.microsoft.com/office/drawing/2010/main" xmlns:a16="http://schemas.microsoft.com/office/drawing/2014/main" xmlns="" w="9525">
+                <a14:hiddenLine xmlns="" xmlns:a16="http://schemas.microsoft.com/office/drawing/2014/main" xmlns:a14="http://schemas.microsoft.com/office/drawing/2010/main" xmlns:p14="http://schemas.microsoft.com/office/powerpoint/2010/main" w="9525">
                   <a:solidFill>
                     <a:srgbClr val="000000"/>
                   </a:solidFill>
@@ -17160,7 +17668,7 @@
             </a:ln>
             <a:extLst>
               <a:ext uri="{91240B29-F687-4f45-9708-019B960494DF}">
-                <a14:hiddenLine xmlns:p14="http://schemas.microsoft.com/office/powerpoint/2010/main" xmlns:a14="http://schemas.microsoft.com/office/drawing/2010/main" xmlns:a16="http://schemas.microsoft.com/office/drawing/2014/main" xmlns="" w="9525">
+                <a14:hiddenLine xmlns="" xmlns:a16="http://schemas.microsoft.com/office/drawing/2014/main" xmlns:a14="http://schemas.microsoft.com/office/drawing/2010/main" xmlns:p14="http://schemas.microsoft.com/office/powerpoint/2010/main" w="9525">
                   <a:solidFill>
                     <a:srgbClr val="000000"/>
                   </a:solidFill>
@@ -17237,7 +17745,7 @@
             </a:ln>
             <a:extLst>
               <a:ext uri="{91240B29-F687-4f45-9708-019B960494DF}">
-                <a14:hiddenLine xmlns:p14="http://schemas.microsoft.com/office/powerpoint/2010/main" xmlns:a14="http://schemas.microsoft.com/office/drawing/2010/main" xmlns:a16="http://schemas.microsoft.com/office/drawing/2014/main" xmlns="" w="9525">
+                <a14:hiddenLine xmlns="" xmlns:a16="http://schemas.microsoft.com/office/drawing/2014/main" xmlns:a14="http://schemas.microsoft.com/office/drawing/2010/main" xmlns:p14="http://schemas.microsoft.com/office/powerpoint/2010/main" w="9525">
                   <a:solidFill>
                     <a:srgbClr val="000000"/>
                   </a:solidFill>
@@ -17314,7 +17822,7 @@
             </a:ln>
             <a:extLst>
               <a:ext uri="{91240B29-F687-4f45-9708-019B960494DF}">
-                <a14:hiddenLine xmlns:p14="http://schemas.microsoft.com/office/powerpoint/2010/main" xmlns:a14="http://schemas.microsoft.com/office/drawing/2010/main" xmlns:a16="http://schemas.microsoft.com/office/drawing/2014/main" xmlns="" w="9525">
+                <a14:hiddenLine xmlns="" xmlns:a16="http://schemas.microsoft.com/office/drawing/2014/main" xmlns:a14="http://schemas.microsoft.com/office/drawing/2010/main" xmlns:p14="http://schemas.microsoft.com/office/powerpoint/2010/main" w="9525">
                   <a:solidFill>
                     <a:srgbClr val="000000"/>
                   </a:solidFill>
@@ -17419,7 +17927,7 @@
             </a:ln>
             <a:extLst>
               <a:ext uri="{91240B29-F687-4f45-9708-019B960494DF}">
-                <a14:hiddenLine xmlns:p14="http://schemas.microsoft.com/office/powerpoint/2010/main" xmlns:a14="http://schemas.microsoft.com/office/drawing/2010/main" xmlns:a16="http://schemas.microsoft.com/office/drawing/2014/main" xmlns="" w="9525">
+                <a14:hiddenLine xmlns="" xmlns:a16="http://schemas.microsoft.com/office/drawing/2014/main" xmlns:a14="http://schemas.microsoft.com/office/drawing/2010/main" xmlns:p14="http://schemas.microsoft.com/office/powerpoint/2010/main" w="9525">
                   <a:solidFill>
                     <a:srgbClr val="000000"/>
                   </a:solidFill>
@@ -17502,7 +18010,7 @@
             </a:ln>
             <a:extLst>
               <a:ext uri="{91240B29-F687-4f45-9708-019B960494DF}">
-                <a14:hiddenLine xmlns:p14="http://schemas.microsoft.com/office/powerpoint/2010/main" xmlns:a14="http://schemas.microsoft.com/office/drawing/2010/main" xmlns:a16="http://schemas.microsoft.com/office/drawing/2014/main" xmlns="" w="9525">
+                <a14:hiddenLine xmlns="" xmlns:a16="http://schemas.microsoft.com/office/drawing/2014/main" xmlns:a14="http://schemas.microsoft.com/office/drawing/2010/main" xmlns:p14="http://schemas.microsoft.com/office/powerpoint/2010/main" w="9525">
                   <a:solidFill>
                     <a:srgbClr val="000000"/>
                   </a:solidFill>
@@ -17579,7 +18087,7 @@
             </a:ln>
             <a:extLst>
               <a:ext uri="{91240B29-F687-4f45-9708-019B960494DF}">
-                <a14:hiddenLine xmlns:p14="http://schemas.microsoft.com/office/powerpoint/2010/main" xmlns:a14="http://schemas.microsoft.com/office/drawing/2010/main" xmlns:a16="http://schemas.microsoft.com/office/drawing/2014/main" xmlns="" w="9525">
+                <a14:hiddenLine xmlns="" xmlns:a16="http://schemas.microsoft.com/office/drawing/2014/main" xmlns:a14="http://schemas.microsoft.com/office/drawing/2010/main" xmlns:p14="http://schemas.microsoft.com/office/powerpoint/2010/main" w="9525">
                   <a:solidFill>
                     <a:srgbClr val="000000"/>
                   </a:solidFill>
@@ -17684,7 +18192,7 @@
             </a:ln>
             <a:extLst>
               <a:ext uri="{91240B29-F687-4f45-9708-019B960494DF}">
-                <a14:hiddenLine xmlns:p14="http://schemas.microsoft.com/office/powerpoint/2010/main" xmlns:a14="http://schemas.microsoft.com/office/drawing/2010/main" xmlns:a16="http://schemas.microsoft.com/office/drawing/2014/main" xmlns="" w="9525">
+                <a14:hiddenLine xmlns="" xmlns:a16="http://schemas.microsoft.com/office/drawing/2014/main" xmlns:a14="http://schemas.microsoft.com/office/drawing/2010/main" xmlns:p14="http://schemas.microsoft.com/office/powerpoint/2010/main" w="9525">
                   <a:solidFill>
                     <a:srgbClr val="000000"/>
                   </a:solidFill>
@@ -17761,7 +18269,7 @@
             </a:ln>
             <a:extLst>
               <a:ext uri="{91240B29-F687-4f45-9708-019B960494DF}">
-                <a14:hiddenLine xmlns:p14="http://schemas.microsoft.com/office/powerpoint/2010/main" xmlns:a14="http://schemas.microsoft.com/office/drawing/2010/main" xmlns:a16="http://schemas.microsoft.com/office/drawing/2014/main" xmlns="" w="9525">
+                <a14:hiddenLine xmlns="" xmlns:a16="http://schemas.microsoft.com/office/drawing/2014/main" xmlns:a14="http://schemas.microsoft.com/office/drawing/2010/main" xmlns:p14="http://schemas.microsoft.com/office/powerpoint/2010/main" w="9525">
                   <a:solidFill>
                     <a:srgbClr val="000000"/>
                   </a:solidFill>
@@ -17866,7 +18374,7 @@
             </a:ln>
             <a:extLst>
               <a:ext uri="{91240B29-F687-4f45-9708-019B960494DF}">
-                <a14:hiddenLine xmlns:p14="http://schemas.microsoft.com/office/powerpoint/2010/main" xmlns:a14="http://schemas.microsoft.com/office/drawing/2010/main" xmlns:a16="http://schemas.microsoft.com/office/drawing/2014/main" xmlns="" w="9525">
+                <a14:hiddenLine xmlns="" xmlns:a16="http://schemas.microsoft.com/office/drawing/2014/main" xmlns:a14="http://schemas.microsoft.com/office/drawing/2010/main" xmlns:p14="http://schemas.microsoft.com/office/powerpoint/2010/main" w="9525">
                   <a:solidFill>
                     <a:srgbClr val="000000"/>
                   </a:solidFill>
@@ -17943,7 +18451,7 @@
             </a:ln>
             <a:extLst>
               <a:ext uri="{91240B29-F687-4f45-9708-019B960494DF}">
-                <a14:hiddenLine xmlns:p14="http://schemas.microsoft.com/office/powerpoint/2010/main" xmlns:a14="http://schemas.microsoft.com/office/drawing/2010/main" xmlns:a16="http://schemas.microsoft.com/office/drawing/2014/main" xmlns="" w="9525">
+                <a14:hiddenLine xmlns="" xmlns:a16="http://schemas.microsoft.com/office/drawing/2014/main" xmlns:a14="http://schemas.microsoft.com/office/drawing/2010/main" xmlns:p14="http://schemas.microsoft.com/office/powerpoint/2010/main" w="9525">
                   <a:solidFill>
                     <a:srgbClr val="000000"/>
                   </a:solidFill>
@@ -18048,7 +18556,7 @@
             </a:ln>
             <a:extLst>
               <a:ext uri="{91240B29-F687-4f45-9708-019B960494DF}">
-                <a14:hiddenLine xmlns:p14="http://schemas.microsoft.com/office/powerpoint/2010/main" xmlns:a14="http://schemas.microsoft.com/office/drawing/2010/main" xmlns:a16="http://schemas.microsoft.com/office/drawing/2014/main" xmlns="" w="9525">
+                <a14:hiddenLine xmlns="" xmlns:a16="http://schemas.microsoft.com/office/drawing/2014/main" xmlns:a14="http://schemas.microsoft.com/office/drawing/2010/main" xmlns:p14="http://schemas.microsoft.com/office/powerpoint/2010/main" w="9525">
                   <a:solidFill>
                     <a:srgbClr val="000000"/>
                   </a:solidFill>
@@ -18097,7 +18605,7 @@
             </a:ln>
             <a:extLst>
               <a:ext uri="{91240B29-F687-4f45-9708-019B960494DF}">
-                <a14:hiddenLine xmlns:p14="http://schemas.microsoft.com/office/powerpoint/2010/main" xmlns:a14="http://schemas.microsoft.com/office/drawing/2010/main" xmlns:a16="http://schemas.microsoft.com/office/drawing/2014/main" xmlns="" w="9525">
+                <a14:hiddenLine xmlns="" xmlns:a16="http://schemas.microsoft.com/office/drawing/2014/main" xmlns:a14="http://schemas.microsoft.com/office/drawing/2010/main" xmlns:p14="http://schemas.microsoft.com/office/powerpoint/2010/main" w="9525">
                   <a:solidFill>
                     <a:srgbClr val="000000"/>
                   </a:solidFill>
@@ -18177,7 +18685,7 @@
             </a:ln>
             <a:extLst>
               <a:ext uri="{91240B29-F687-4f45-9708-019B960494DF}">
-                <a14:hiddenLine xmlns:p14="http://schemas.microsoft.com/office/powerpoint/2010/main" xmlns:a14="http://schemas.microsoft.com/office/drawing/2010/main" xmlns:a16="http://schemas.microsoft.com/office/drawing/2014/main" xmlns="" w="9525">
+                <a14:hiddenLine xmlns="" xmlns:a16="http://schemas.microsoft.com/office/drawing/2014/main" xmlns:a14="http://schemas.microsoft.com/office/drawing/2010/main" xmlns:p14="http://schemas.microsoft.com/office/powerpoint/2010/main" w="9525">
                   <a:solidFill>
                     <a:srgbClr val="000000"/>
                   </a:solidFill>
@@ -18282,7 +18790,7 @@
             </a:ln>
             <a:extLst>
               <a:ext uri="{91240B29-F687-4f45-9708-019B960494DF}">
-                <a14:hiddenLine xmlns:p14="http://schemas.microsoft.com/office/powerpoint/2010/main" xmlns:a14="http://schemas.microsoft.com/office/drawing/2010/main" xmlns:a16="http://schemas.microsoft.com/office/drawing/2014/main" xmlns="" w="9525">
+                <a14:hiddenLine xmlns="" xmlns:a16="http://schemas.microsoft.com/office/drawing/2014/main" xmlns:a14="http://schemas.microsoft.com/office/drawing/2010/main" xmlns:p14="http://schemas.microsoft.com/office/powerpoint/2010/main" w="9525">
                   <a:solidFill>
                     <a:srgbClr val="000000"/>
                   </a:solidFill>
@@ -18359,7 +18867,7 @@
             </a:ln>
             <a:extLst>
               <a:ext uri="{91240B29-F687-4f45-9708-019B960494DF}">
-                <a14:hiddenLine xmlns:p14="http://schemas.microsoft.com/office/powerpoint/2010/main" xmlns:a14="http://schemas.microsoft.com/office/drawing/2010/main" xmlns:a16="http://schemas.microsoft.com/office/drawing/2014/main" xmlns="" w="9525">
+                <a14:hiddenLine xmlns="" xmlns:a16="http://schemas.microsoft.com/office/drawing/2014/main" xmlns:a14="http://schemas.microsoft.com/office/drawing/2010/main" xmlns:p14="http://schemas.microsoft.com/office/powerpoint/2010/main" w="9525">
                   <a:solidFill>
                     <a:srgbClr val="000000"/>
                   </a:solidFill>
@@ -18464,7 +18972,7 @@
             </a:ln>
             <a:extLst>
               <a:ext uri="{91240B29-F687-4f45-9708-019B960494DF}">
-                <a14:hiddenLine xmlns:p14="http://schemas.microsoft.com/office/powerpoint/2010/main" xmlns:a14="http://schemas.microsoft.com/office/drawing/2010/main" xmlns:a16="http://schemas.microsoft.com/office/drawing/2014/main" xmlns="" w="9525">
+                <a14:hiddenLine xmlns="" xmlns:a16="http://schemas.microsoft.com/office/drawing/2014/main" xmlns:a14="http://schemas.microsoft.com/office/drawing/2010/main" xmlns:p14="http://schemas.microsoft.com/office/powerpoint/2010/main" w="9525">
                   <a:solidFill>
                     <a:srgbClr val="000000"/>
                   </a:solidFill>
@@ -18569,7 +19077,7 @@
             </a:ln>
             <a:extLst>
               <a:ext uri="{91240B29-F687-4f45-9708-019B960494DF}">
-                <a14:hiddenLine xmlns:p14="http://schemas.microsoft.com/office/powerpoint/2010/main" xmlns:a14="http://schemas.microsoft.com/office/drawing/2010/main" xmlns:a16="http://schemas.microsoft.com/office/drawing/2014/main" xmlns="" w="9525">
+                <a14:hiddenLine xmlns="" xmlns:a16="http://schemas.microsoft.com/office/drawing/2014/main" xmlns:a14="http://schemas.microsoft.com/office/drawing/2010/main" xmlns:p14="http://schemas.microsoft.com/office/powerpoint/2010/main" w="9525">
                   <a:solidFill>
                     <a:srgbClr val="000000"/>
                   </a:solidFill>
@@ -18649,7 +19157,7 @@
             </a:ln>
             <a:extLst>
               <a:ext uri="{91240B29-F687-4f45-9708-019B960494DF}">
-                <a14:hiddenLine xmlns:p14="http://schemas.microsoft.com/office/powerpoint/2010/main" xmlns:a14="http://schemas.microsoft.com/office/drawing/2010/main" xmlns:a16="http://schemas.microsoft.com/office/drawing/2014/main" xmlns="" w="9525">
+                <a14:hiddenLine xmlns="" xmlns:a16="http://schemas.microsoft.com/office/drawing/2014/main" xmlns:a14="http://schemas.microsoft.com/office/drawing/2010/main" xmlns:p14="http://schemas.microsoft.com/office/powerpoint/2010/main" w="9525">
                   <a:solidFill>
                     <a:srgbClr val="000000"/>
                   </a:solidFill>
@@ -18726,7 +19234,7 @@
             </a:ln>
             <a:extLst>
               <a:ext uri="{91240B29-F687-4f45-9708-019B960494DF}">
-                <a14:hiddenLine xmlns:p14="http://schemas.microsoft.com/office/powerpoint/2010/main" xmlns:a14="http://schemas.microsoft.com/office/drawing/2010/main" xmlns:a16="http://schemas.microsoft.com/office/drawing/2014/main" xmlns="" w="9525">
+                <a14:hiddenLine xmlns="" xmlns:a16="http://schemas.microsoft.com/office/drawing/2014/main" xmlns:a14="http://schemas.microsoft.com/office/drawing/2010/main" xmlns:p14="http://schemas.microsoft.com/office/powerpoint/2010/main" w="9525">
                   <a:solidFill>
                     <a:srgbClr val="000000"/>
                   </a:solidFill>
@@ -18831,7 +19339,7 @@
             </a:ln>
             <a:extLst>
               <a:ext uri="{91240B29-F687-4f45-9708-019B960494DF}">
-                <a14:hiddenLine xmlns:p14="http://schemas.microsoft.com/office/powerpoint/2010/main" xmlns:a14="http://schemas.microsoft.com/office/drawing/2010/main" xmlns:a16="http://schemas.microsoft.com/office/drawing/2014/main" xmlns="" w="9525">
+                <a14:hiddenLine xmlns="" xmlns:a16="http://schemas.microsoft.com/office/drawing/2014/main" xmlns:a14="http://schemas.microsoft.com/office/drawing/2010/main" xmlns:p14="http://schemas.microsoft.com/office/powerpoint/2010/main" w="9525">
                   <a:solidFill>
                     <a:srgbClr val="000000"/>
                   </a:solidFill>
@@ -18936,7 +19444,7 @@
             </a:ln>
             <a:extLst>
               <a:ext uri="{91240B29-F687-4f45-9708-019B960494DF}">
-                <a14:hiddenLine xmlns:p14="http://schemas.microsoft.com/office/powerpoint/2010/main" xmlns:a14="http://schemas.microsoft.com/office/drawing/2010/main" xmlns:a16="http://schemas.microsoft.com/office/drawing/2014/main" xmlns="" w="9525">
+                <a14:hiddenLine xmlns="" xmlns:a16="http://schemas.microsoft.com/office/drawing/2014/main" xmlns:a14="http://schemas.microsoft.com/office/drawing/2010/main" xmlns:p14="http://schemas.microsoft.com/office/powerpoint/2010/main" w="9525">
                   <a:solidFill>
                     <a:srgbClr val="000000"/>
                   </a:solidFill>
@@ -19013,7 +19521,7 @@
             </a:ln>
             <a:extLst>
               <a:ext uri="{91240B29-F687-4f45-9708-019B960494DF}">
-                <a14:hiddenLine xmlns:p14="http://schemas.microsoft.com/office/powerpoint/2010/main" xmlns:a14="http://schemas.microsoft.com/office/drawing/2010/main" xmlns:a16="http://schemas.microsoft.com/office/drawing/2014/main" xmlns="" w="9525">
+                <a14:hiddenLine xmlns="" xmlns:a16="http://schemas.microsoft.com/office/drawing/2014/main" xmlns:a14="http://schemas.microsoft.com/office/drawing/2010/main" xmlns:p14="http://schemas.microsoft.com/office/powerpoint/2010/main" w="9525">
                   <a:solidFill>
                     <a:srgbClr val="000000"/>
                   </a:solidFill>
@@ -19148,7 +19656,7 @@
             </a:ln>
             <a:extLst>
               <a:ext uri="{91240B29-F687-4f45-9708-019B960494DF}">
-                <a14:hiddenLine xmlns:p14="http://schemas.microsoft.com/office/powerpoint/2010/main" xmlns:a14="http://schemas.microsoft.com/office/drawing/2010/main" xmlns:a16="http://schemas.microsoft.com/office/drawing/2014/main" xmlns="" w="9525">
+                <a14:hiddenLine xmlns="" xmlns:a16="http://schemas.microsoft.com/office/drawing/2014/main" xmlns:a14="http://schemas.microsoft.com/office/drawing/2010/main" xmlns:p14="http://schemas.microsoft.com/office/powerpoint/2010/main" w="9525">
                   <a:solidFill>
                     <a:srgbClr val="000000"/>
                   </a:solidFill>
@@ -19231,7 +19739,7 @@
             </a:ln>
             <a:extLst>
               <a:ext uri="{91240B29-F687-4f45-9708-019B960494DF}">
-                <a14:hiddenLine xmlns:p14="http://schemas.microsoft.com/office/powerpoint/2010/main" xmlns:a14="http://schemas.microsoft.com/office/drawing/2010/main" xmlns:a16="http://schemas.microsoft.com/office/drawing/2014/main" xmlns="" w="9525">
+                <a14:hiddenLine xmlns="" xmlns:a16="http://schemas.microsoft.com/office/drawing/2014/main" xmlns:a14="http://schemas.microsoft.com/office/drawing/2010/main" xmlns:p14="http://schemas.microsoft.com/office/powerpoint/2010/main" w="9525">
                   <a:solidFill>
                     <a:srgbClr val="000000"/>
                   </a:solidFill>
@@ -19336,7 +19844,7 @@
             </a:ln>
             <a:extLst>
               <a:ext uri="{91240B29-F687-4f45-9708-019B960494DF}">
-                <a14:hiddenLine xmlns:p14="http://schemas.microsoft.com/office/powerpoint/2010/main" xmlns:a14="http://schemas.microsoft.com/office/drawing/2010/main" xmlns:a16="http://schemas.microsoft.com/office/drawing/2014/main" xmlns="" w="9525">
+                <a14:hiddenLine xmlns="" xmlns:a16="http://schemas.microsoft.com/office/drawing/2014/main" xmlns:a14="http://schemas.microsoft.com/office/drawing/2010/main" xmlns:p14="http://schemas.microsoft.com/office/powerpoint/2010/main" w="9525">
                   <a:solidFill>
                     <a:srgbClr val="000000"/>
                   </a:solidFill>
@@ -19373,37 +19881,13 @@
         </p:spPr>
         <p:txBody>
           <a:bodyPr>
-            <a:normAutofit fontScale="62500" lnSpcReduction="20000"/>
+            <a:normAutofit/>
           </a:bodyPr>
           <a:lstStyle/>
           <a:p>
             <a:r>
               <a:rPr lang="en-US" dirty="0"/>
-              <a:t>No running, snatching, fighting etc. You will </a:t>
-            </a:r>
-            <a:r>
-              <a:rPr lang="en-US" b="1" dirty="0">
-                <a:solidFill>
-                  <a:srgbClr val="FF0000"/>
-                </a:solidFill>
-              </a:rPr>
-              <a:t>lose</a:t>
-            </a:r>
-            <a:r>
-              <a:rPr lang="en-US" dirty="0"/>
-              <a:t> </a:t>
-            </a:r>
-            <a:r>
-              <a:rPr lang="en-US" b="1" dirty="0">
-                <a:solidFill>
-                  <a:srgbClr val="FF0000"/>
-                </a:solidFill>
-              </a:rPr>
-              <a:t>-2 </a:t>
-            </a:r>
-            <a:r>
-              <a:rPr lang="en-US" dirty="0"/>
-              <a:t>points if you do so.</a:t>
+              <a:t>Behavior</a:t>
             </a:r>
           </a:p>
           <a:p>
@@ -19427,13 +19911,7 @@
           <a:p>
             <a:r>
               <a:rPr lang="en-US" dirty="0"/>
-              <a:t>Right QR code </a:t>
-            </a:r>
-            <a:r>
-              <a:rPr lang="en-US" dirty="0">
-                <a:sym typeface="Wingdings" panose="05000000000000000000" pitchFamily="2" charset="2"/>
-              </a:rPr>
-              <a:t> </a:t>
+              <a:t>Points: </a:t>
             </a:r>
             <a:r>
               <a:rPr lang="en-US" b="1" dirty="0">
@@ -19442,7 +19920,42 @@
                 </a:solidFill>
                 <a:sym typeface="Wingdings" panose="05000000000000000000" pitchFamily="2" charset="2"/>
               </a:rPr>
-              <a:t>+10</a:t>
+              <a:t>+10 </a:t>
+            </a:r>
+            <a:r>
+              <a:rPr lang="en-US" dirty="0"/>
+              <a:t>or </a:t>
+            </a:r>
+            <a:r>
+              <a:rPr lang="en-US" b="1" dirty="0">
+                <a:solidFill>
+                  <a:srgbClr val="00B050"/>
+                </a:solidFill>
+                <a:sym typeface="Wingdings" panose="05000000000000000000" pitchFamily="2" charset="2"/>
+              </a:rPr>
+              <a:t> </a:t>
+            </a:r>
+            <a:r>
+              <a:rPr lang="en-US" b="1" dirty="0">
+                <a:solidFill>
+                  <a:srgbClr val="FF0000"/>
+                </a:solidFill>
+                <a:sym typeface="Wingdings" panose="05000000000000000000" pitchFamily="2" charset="2"/>
+              </a:rPr>
+              <a:t>- 1  </a:t>
+            </a:r>
+            <a:r>
+              <a:rPr lang="en-US" dirty="0"/>
+              <a:t>or   </a:t>
+            </a:r>
+            <a:r>
+              <a:rPr lang="en-US" b="1" dirty="0">
+                <a:solidFill>
+                  <a:srgbClr val="FF0000"/>
+                </a:solidFill>
+                <a:sym typeface="Wingdings" panose="05000000000000000000" pitchFamily="2" charset="2"/>
+              </a:rPr>
+              <a:t>-2</a:t>
             </a:r>
             <a:endParaRPr lang="en-US" b="1" dirty="0">
               <a:solidFill>
@@ -19453,66 +19966,19 @@
           <a:p>
             <a:r>
               <a:rPr lang="en-US" dirty="0"/>
-              <a:t>Wrong QR codes </a:t>
-            </a:r>
-            <a:r>
-              <a:rPr lang="en-US" dirty="0">
-                <a:sym typeface="Wingdings" panose="05000000000000000000" pitchFamily="2" charset="2"/>
-              </a:rPr>
-              <a:t> </a:t>
-            </a:r>
-            <a:r>
-              <a:rPr lang="en-US" b="1" dirty="0">
-                <a:solidFill>
-                  <a:srgbClr val="FF0000"/>
-                </a:solidFill>
-                <a:sym typeface="Wingdings" panose="05000000000000000000" pitchFamily="2" charset="2"/>
-              </a:rPr>
-              <a:t>-1 or -2</a:t>
-            </a:r>
-            <a:endParaRPr lang="en-US" b="1" dirty="0">
-              <a:solidFill>
-                <a:srgbClr val="FF0000"/>
-              </a:solidFill>
-            </a:endParaRPr>
-          </a:p>
-          <a:p>
-            <a:pPr lvl="1"/>
-            <a:r>
-              <a:rPr lang="en-US" dirty="0"/>
-              <a:t>Remember your game code (D, M or H)</a:t>
+              <a:t>fair chance to all</a:t>
             </a:r>
           </a:p>
           <a:p>
             <a:r>
               <a:rPr lang="en-US" dirty="0"/>
-              <a:t>Don’t rush, winner is based on Points. However, first team </a:t>
-            </a:r>
-            <a:r>
-              <a:rPr lang="en-US" b="1" dirty="0">
-                <a:solidFill>
-                  <a:srgbClr val="00B050"/>
-                </a:solidFill>
-              </a:rPr>
-              <a:t>4 points</a:t>
+              <a:t>Put back the thing</a:t>
             </a:r>
           </a:p>
           <a:p>
             <a:r>
               <a:rPr lang="en-US" dirty="0"/>
-              <a:t>Everyone in team should get fair chance</a:t>
-            </a:r>
-          </a:p>
-          <a:p>
-            <a:r>
-              <a:rPr lang="en-US" dirty="0"/>
-              <a:t>Put back the thing after scanning the QR code</a:t>
-            </a:r>
-          </a:p>
-          <a:p>
-            <a:r>
-              <a:rPr lang="en-US" dirty="0"/>
-              <a:t>Ask Adult Help if required</a:t>
+              <a:t>Ask Adult help (only if required)</a:t>
             </a:r>
             <a:endParaRPr lang="en-NZ" dirty="0"/>
           </a:p>
@@ -19810,153 +20276,6 @@
                                           <p:spTgt spid="3">
                                             <p:txEl>
                                               <p:pRg st="5" end="5"/>
-                                            </p:txEl>
-                                          </p:spTgt>
-                                        </p:tgtEl>
-                                        <p:attrNameLst>
-                                          <p:attrName>style.visibility</p:attrName>
-                                        </p:attrNameLst>
-                                      </p:cBhvr>
-                                      <p:to>
-                                        <p:strVal val="visible"/>
-                                      </p:to>
-                                    </p:set>
-                                  </p:childTnLst>
-                                </p:cTn>
-                              </p:par>
-                            </p:childTnLst>
-                          </p:cTn>
-                        </p:par>
-                      </p:childTnLst>
-                    </p:cTn>
-                  </p:par>
-                  <p:par>
-                    <p:cTn id="27" fill="hold">
-                      <p:stCondLst>
-                        <p:cond delay="indefinite"/>
-                      </p:stCondLst>
-                      <p:childTnLst>
-                        <p:par>
-                          <p:cTn id="28" fill="hold">
-                            <p:stCondLst>
-                              <p:cond delay="0"/>
-                            </p:stCondLst>
-                            <p:childTnLst>
-                              <p:par>
-                                <p:cTn id="29" presetID="1" presetClass="entr" presetSubtype="0" fill="hold" nodeType="clickEffect">
-                                  <p:stCondLst>
-                                    <p:cond delay="0"/>
-                                  </p:stCondLst>
-                                  <p:childTnLst>
-                                    <p:set>
-                                      <p:cBhvr>
-                                        <p:cTn id="30" dur="1" fill="hold">
-                                          <p:stCondLst>
-                                            <p:cond delay="0"/>
-                                          </p:stCondLst>
-                                        </p:cTn>
-                                        <p:tgtEl>
-                                          <p:spTgt spid="3">
-                                            <p:txEl>
-                                              <p:pRg st="6" end="6"/>
-                                            </p:txEl>
-                                          </p:spTgt>
-                                        </p:tgtEl>
-                                        <p:attrNameLst>
-                                          <p:attrName>style.visibility</p:attrName>
-                                        </p:attrNameLst>
-                                      </p:cBhvr>
-                                      <p:to>
-                                        <p:strVal val="visible"/>
-                                      </p:to>
-                                    </p:set>
-                                  </p:childTnLst>
-                                </p:cTn>
-                              </p:par>
-                            </p:childTnLst>
-                          </p:cTn>
-                        </p:par>
-                      </p:childTnLst>
-                    </p:cTn>
-                  </p:par>
-                  <p:par>
-                    <p:cTn id="31" fill="hold">
-                      <p:stCondLst>
-                        <p:cond delay="indefinite"/>
-                      </p:stCondLst>
-                      <p:childTnLst>
-                        <p:par>
-                          <p:cTn id="32" fill="hold">
-                            <p:stCondLst>
-                              <p:cond delay="0"/>
-                            </p:stCondLst>
-                            <p:childTnLst>
-                              <p:par>
-                                <p:cTn id="33" presetID="1" presetClass="entr" presetSubtype="0" fill="hold" nodeType="clickEffect">
-                                  <p:stCondLst>
-                                    <p:cond delay="0"/>
-                                  </p:stCondLst>
-                                  <p:childTnLst>
-                                    <p:set>
-                                      <p:cBhvr>
-                                        <p:cTn id="34" dur="1" fill="hold">
-                                          <p:stCondLst>
-                                            <p:cond delay="0"/>
-                                          </p:stCondLst>
-                                        </p:cTn>
-                                        <p:tgtEl>
-                                          <p:spTgt spid="3">
-                                            <p:txEl>
-                                              <p:pRg st="7" end="7"/>
-                                            </p:txEl>
-                                          </p:spTgt>
-                                        </p:tgtEl>
-                                        <p:attrNameLst>
-                                          <p:attrName>style.visibility</p:attrName>
-                                        </p:attrNameLst>
-                                      </p:cBhvr>
-                                      <p:to>
-                                        <p:strVal val="visible"/>
-                                      </p:to>
-                                    </p:set>
-                                  </p:childTnLst>
-                                </p:cTn>
-                              </p:par>
-                            </p:childTnLst>
-                          </p:cTn>
-                        </p:par>
-                      </p:childTnLst>
-                    </p:cTn>
-                  </p:par>
-                  <p:par>
-                    <p:cTn id="35" fill="hold">
-                      <p:stCondLst>
-                        <p:cond delay="indefinite"/>
-                      </p:stCondLst>
-                      <p:childTnLst>
-                        <p:par>
-                          <p:cTn id="36" fill="hold">
-                            <p:stCondLst>
-                              <p:cond delay="0"/>
-                            </p:stCondLst>
-                            <p:childTnLst>
-                              <p:par>
-                                <p:cTn id="37" presetID="1" presetClass="entr" presetSubtype="0" fill="hold" nodeType="clickEffect">
-                                  <p:stCondLst>
-                                    <p:cond delay="0"/>
-                                  </p:stCondLst>
-                                  <p:childTnLst>
-                                    <p:set>
-                                      <p:cBhvr>
-                                        <p:cTn id="38" dur="1" fill="hold">
-                                          <p:stCondLst>
-                                            <p:cond delay="0"/>
-                                          </p:stCondLst>
-                                        </p:cTn>
-                                        <p:tgtEl>
-                                          <p:spTgt spid="3">
-                                            <p:txEl>
-                                              <p:pRg st="8" end="8"/>
                                             </p:txEl>
                                           </p:spTgt>
                                         </p:tgtEl>

</xml_diff>